<commit_message>
updates to the notebook and presentation
</commit_message>
<xml_diff>
--- a/Michael_Green_Metis_Project2.pptx
+++ b/Michael_Green_Metis_Project2.pptx
@@ -3892,1836 +3892,6 @@
           </a:p>
         </p:txBody>
       </p:sp>
-      <mc:AlternateContent xmlns:mc="http://schemas.openxmlformats.org/markup-compatibility/2006" xmlns:a14="http://schemas.microsoft.com/office/drawing/2010/main">
-        <mc:Choice Requires="a14">
-          <p:sp>
-            <p:nvSpPr>
-              <p:cNvPr id="3" name="Content Placeholder 2">
-                <a:extLst>
-                  <a:ext uri="{FF2B5EF4-FFF2-40B4-BE49-F238E27FC236}">
-                    <a16:creationId xmlns:a16="http://schemas.microsoft.com/office/drawing/2014/main" id="{5694EFCD-EC71-C84D-A1D5-98B3236420DF}"/>
-                  </a:ext>
-                </a:extLst>
-              </p:cNvPr>
-              <p:cNvSpPr>
-                <a:spLocks noGrp="1"/>
-              </p:cNvSpPr>
-              <p:nvPr>
-                <p:ph idx="1"/>
-              </p:nvPr>
-            </p:nvSpPr>
-            <p:spPr>
-              <a:xfrm>
-                <a:off x="528204" y="921760"/>
-                <a:ext cx="11135591" cy="5790767"/>
-              </a:xfrm>
-            </p:spPr>
-            <p:txBody>
-              <a:bodyPr>
-                <a:normAutofit fontScale="92500"/>
-              </a:bodyPr>
-              <a:lstStyle/>
-              <a:p>
-                <a:pPr marL="0" indent="0">
-                  <a:buNone/>
-                </a:pPr>
-                <a14:m>
-                  <m:oMathPara xmlns:m="http://schemas.openxmlformats.org/officeDocument/2006/math">
-                    <m:oMathParaPr>
-                      <m:jc m:val="centerGroup"/>
-                    </m:oMathParaPr>
-                    <m:oMath xmlns:m="http://schemas.openxmlformats.org/officeDocument/2006/math">
-                      <m:r>
-                        <a:rPr lang="en-US" sz="1300" b="0" i="1" smtClean="0">
-                          <a:latin typeface="Cambria Math" panose="02040503050406030204" pitchFamily="18" charset="0"/>
-                        </a:rPr>
-                        <m:t>𝑦</m:t>
-                      </m:r>
-                      <m:r>
-                        <a:rPr lang="en-US" sz="1300" b="0" i="1" smtClean="0">
-                          <a:latin typeface="Cambria Math" panose="02040503050406030204" pitchFamily="18" charset="0"/>
-                        </a:rPr>
-                        <m:t>=</m:t>
-                      </m:r>
-                      <m:r>
-                        <m:rPr>
-                          <m:nor/>
-                        </m:rPr>
-                        <a:rPr lang="en-US" sz="1300" smtClean="0">
-                          <a:latin typeface="Courier" pitchFamily="2" charset="0"/>
-                        </a:rPr>
-                        <m:t>0.0258</m:t>
-                      </m:r>
-                      <m:r>
-                        <m:rPr>
-                          <m:nor/>
-                        </m:rPr>
-                        <a:rPr lang="en-US" sz="1300" b="0" i="0" smtClean="0">
-                          <a:latin typeface="Courier" pitchFamily="2" charset="0"/>
-                        </a:rPr>
-                        <m:t>runtime</m:t>
-                      </m:r>
-                      <m:r>
-                        <m:rPr>
-                          <m:nor/>
-                        </m:rPr>
-                        <a:rPr lang="en-US" sz="1300" b="0" i="0" smtClean="0">
-                          <a:latin typeface="Courier" pitchFamily="2" charset="0"/>
-                        </a:rPr>
-                        <m:t> </m:t>
-                      </m:r>
-                    </m:oMath>
-                  </m:oMathPara>
-                </a14:m>
-                <a:endParaRPr lang="en-US" sz="1300" b="0" i="0" dirty="0">
-                  <a:latin typeface="Courier" pitchFamily="2" charset="0"/>
-                </a:endParaRPr>
-              </a:p>
-              <a:p>
-                <a:pPr marL="0" indent="0">
-                  <a:buNone/>
-                </a:pPr>
-                <a14:m>
-                  <m:oMathPara xmlns:m="http://schemas.openxmlformats.org/officeDocument/2006/math">
-                    <m:oMathParaPr>
-                      <m:jc m:val="centerGroup"/>
-                    </m:oMathParaPr>
-                    <m:oMath xmlns:m="http://schemas.openxmlformats.org/officeDocument/2006/math">
-                      <m:r>
-                        <m:rPr>
-                          <m:nor/>
-                        </m:rPr>
-                        <a:rPr lang="en-US" sz="1300" b="0" i="0" smtClean="0">
-                          <a:latin typeface="Courier" pitchFamily="2" charset="0"/>
-                        </a:rPr>
-                        <m:t>+ 1.878</m:t>
-                      </m:r>
-                      <m:r>
-                        <m:rPr>
-                          <m:nor/>
-                        </m:rPr>
-                        <a:rPr lang="en-US" sz="1300" b="0" i="0" smtClean="0">
-                          <a:latin typeface="Courier" pitchFamily="2" charset="0"/>
-                        </a:rPr>
-                        <m:t>budget</m:t>
-                      </m:r>
-                      <m:r>
-                        <m:rPr>
-                          <m:nor/>
-                        </m:rPr>
-                        <a:rPr lang="en-US" sz="1300" b="0" i="0" smtClean="0">
-                          <a:latin typeface="Courier" pitchFamily="2" charset="0"/>
-                        </a:rPr>
-                        <m:t> </m:t>
-                      </m:r>
-                    </m:oMath>
-                  </m:oMathPara>
-                </a14:m>
-                <a:endParaRPr lang="en-US" sz="1300" b="0" i="0" dirty="0">
-                  <a:latin typeface="Courier" pitchFamily="2" charset="0"/>
-                </a:endParaRPr>
-              </a:p>
-              <a:p>
-                <a:pPr marL="0" indent="0">
-                  <a:buNone/>
-                </a:pPr>
-                <a14:m>
-                  <m:oMathPara xmlns:m="http://schemas.openxmlformats.org/officeDocument/2006/math">
-                    <m:oMathParaPr>
-                      <m:jc m:val="centerGroup"/>
-                    </m:oMathParaPr>
-                    <m:oMath xmlns:m="http://schemas.openxmlformats.org/officeDocument/2006/math">
-                      <m:r>
-                        <m:rPr>
-                          <m:nor/>
-                        </m:rPr>
-                        <a:rPr lang="en-US" sz="1300" b="0" i="0" smtClean="0">
-                          <a:latin typeface="Courier" pitchFamily="2" charset="0"/>
-                        </a:rPr>
-                        <m:t>+ 0.0449</m:t>
-                      </m:r>
-                      <m:r>
-                        <m:rPr>
-                          <m:nor/>
-                        </m:rPr>
-                        <a:rPr lang="en-US" sz="1300" b="0" i="0" smtClean="0">
-                          <a:latin typeface="Courier" pitchFamily="2" charset="0"/>
-                        </a:rPr>
-                        <m:t>August</m:t>
-                      </m:r>
-                      <m:r>
-                        <m:rPr>
-                          <m:nor/>
-                        </m:rPr>
-                        <a:rPr lang="en-US" sz="1300" b="0" i="0" smtClean="0">
-                          <a:latin typeface="Courier" pitchFamily="2" charset="0"/>
-                        </a:rPr>
-                        <m:t> </m:t>
-                      </m:r>
-                    </m:oMath>
-                  </m:oMathPara>
-                </a14:m>
-                <a:endParaRPr lang="en-US" sz="1300" b="0" i="0" dirty="0">
-                  <a:latin typeface="Courier" pitchFamily="2" charset="0"/>
-                </a:endParaRPr>
-              </a:p>
-              <a:p>
-                <a:pPr marL="0" indent="0">
-                  <a:buNone/>
-                </a:pPr>
-                <a14:m>
-                  <m:oMathPara xmlns:m="http://schemas.openxmlformats.org/officeDocument/2006/math">
-                    <m:oMathParaPr>
-                      <m:jc m:val="centerGroup"/>
-                    </m:oMathParaPr>
-                    <m:oMath xmlns:m="http://schemas.openxmlformats.org/officeDocument/2006/math">
-                      <m:r>
-                        <m:rPr>
-                          <m:nor/>
-                        </m:rPr>
-                        <a:rPr lang="en-US" sz="1300" b="0" i="0" smtClean="0">
-                          <a:latin typeface="Courier" pitchFamily="2" charset="0"/>
-                        </a:rPr>
-                        <m:t> − 0.1492</m:t>
-                      </m:r>
-                      <m:r>
-                        <m:rPr>
-                          <m:nor/>
-                        </m:rPr>
-                        <a:rPr lang="en-US" sz="1300" b="0" i="0" smtClean="0">
-                          <a:latin typeface="Courier" pitchFamily="2" charset="0"/>
-                        </a:rPr>
-                        <m:t>December</m:t>
-                      </m:r>
-                      <m:r>
-                        <m:rPr>
-                          <m:nor/>
-                        </m:rPr>
-                        <a:rPr lang="en-US" sz="1300" b="0" i="0" smtClean="0">
-                          <a:latin typeface="Courier" pitchFamily="2" charset="0"/>
-                        </a:rPr>
-                        <m:t> </m:t>
-                      </m:r>
-                    </m:oMath>
-                  </m:oMathPara>
-                </a14:m>
-                <a:endParaRPr lang="en-US" sz="1300" b="0" i="0" dirty="0">
-                  <a:latin typeface="Courier" pitchFamily="2" charset="0"/>
-                </a:endParaRPr>
-              </a:p>
-              <a:p>
-                <a:pPr marL="0" indent="0">
-                  <a:buNone/>
-                </a:pPr>
-                <a14:m>
-                  <m:oMathPara xmlns:m="http://schemas.openxmlformats.org/officeDocument/2006/math">
-                    <m:oMathParaPr>
-                      <m:jc m:val="centerGroup"/>
-                    </m:oMathParaPr>
-                    <m:oMath xmlns:m="http://schemas.openxmlformats.org/officeDocument/2006/math">
-                      <m:r>
-                        <m:rPr>
-                          <m:nor/>
-                        </m:rPr>
-                        <a:rPr lang="en-US" sz="1300" b="0" i="0" smtClean="0">
-                          <a:latin typeface="Courier" pitchFamily="2" charset="0"/>
-                        </a:rPr>
-                        <m:t>0.1206</m:t>
-                      </m:r>
-                      <m:r>
-                        <m:rPr>
-                          <m:nor/>
-                        </m:rPr>
-                        <a:rPr lang="en-US" sz="1300" b="0" i="0" smtClean="0">
-                          <a:latin typeface="Courier" pitchFamily="2" charset="0"/>
-                        </a:rPr>
-                        <m:t>February</m:t>
-                      </m:r>
-                      <m:r>
-                        <m:rPr>
-                          <m:nor/>
-                        </m:rPr>
-                        <a:rPr lang="en-US" sz="1300" b="0" i="0" smtClean="0">
-                          <a:latin typeface="Courier" pitchFamily="2" charset="0"/>
-                        </a:rPr>
-                        <m:t> </m:t>
-                      </m:r>
-                    </m:oMath>
-                  </m:oMathPara>
-                </a14:m>
-                <a:endParaRPr lang="en-US" sz="1300" b="0" i="0" dirty="0">
-                  <a:latin typeface="Courier" pitchFamily="2" charset="0"/>
-                </a:endParaRPr>
-              </a:p>
-              <a:p>
-                <a:pPr marL="0" indent="0">
-                  <a:buNone/>
-                </a:pPr>
-                <a14:m>
-                  <m:oMathPara xmlns:m="http://schemas.openxmlformats.org/officeDocument/2006/math">
-                    <m:oMathParaPr>
-                      <m:jc m:val="centerGroup"/>
-                    </m:oMathParaPr>
-                    <m:oMath xmlns:m="http://schemas.openxmlformats.org/officeDocument/2006/math">
-                      <m:r>
-                        <a:rPr lang="en-US" sz="1300" b="0" i="1" smtClean="0">
-                          <a:latin typeface="Cambria Math" panose="02040503050406030204" pitchFamily="18" charset="0"/>
-                        </a:rPr>
-                        <m:t>–</m:t>
-                      </m:r>
-                      <m:r>
-                        <m:rPr>
-                          <m:nor/>
-                        </m:rPr>
-                        <a:rPr lang="en-US" sz="1300" b="0" i="0" smtClean="0">
-                          <a:latin typeface="Courier" pitchFamily="2" charset="0"/>
-                        </a:rPr>
-                        <m:t> 0.0363</m:t>
-                      </m:r>
-                      <m:r>
-                        <m:rPr>
-                          <m:nor/>
-                        </m:rPr>
-                        <a:rPr lang="en-US" sz="1300" b="0" i="0" smtClean="0">
-                          <a:latin typeface="Courier" pitchFamily="2" charset="0"/>
-                        </a:rPr>
-                        <m:t>January</m:t>
-                      </m:r>
-                      <m:r>
-                        <m:rPr>
-                          <m:nor/>
-                        </m:rPr>
-                        <a:rPr lang="en-US" sz="1300" b="0" i="0" smtClean="0">
-                          <a:latin typeface="Courier" pitchFamily="2" charset="0"/>
-                        </a:rPr>
-                        <m:t> </m:t>
-                      </m:r>
-                    </m:oMath>
-                  </m:oMathPara>
-                </a14:m>
-                <a:endParaRPr lang="en-US" sz="1300" b="0" i="0" dirty="0">
-                  <a:latin typeface="Courier" pitchFamily="2" charset="0"/>
-                </a:endParaRPr>
-              </a:p>
-              <a:p>
-                <a:pPr marL="0" indent="0">
-                  <a:buNone/>
-                </a:pPr>
-                <a14:m>
-                  <m:oMathPara xmlns:m="http://schemas.openxmlformats.org/officeDocument/2006/math">
-                    <m:oMathParaPr>
-                      <m:jc m:val="centerGroup"/>
-                    </m:oMathParaPr>
-                    <m:oMath xmlns:m="http://schemas.openxmlformats.org/officeDocument/2006/math">
-                      <m:r>
-                        <m:rPr>
-                          <m:nor/>
-                        </m:rPr>
-                        <a:rPr lang="en-US" sz="1300" b="0" i="0" smtClean="0">
-                          <a:latin typeface="Courier" pitchFamily="2" charset="0"/>
-                        </a:rPr>
-                        <m:t>−0.0672</m:t>
-                      </m:r>
-                      <m:r>
-                        <m:rPr>
-                          <m:nor/>
-                        </m:rPr>
-                        <a:rPr lang="en-US" sz="1300" b="0" i="0" smtClean="0">
-                          <a:latin typeface="Courier" pitchFamily="2" charset="0"/>
-                        </a:rPr>
-                        <m:t>July</m:t>
-                      </m:r>
-                      <m:r>
-                        <m:rPr>
-                          <m:nor/>
-                        </m:rPr>
-                        <a:rPr lang="en-US" sz="1300" b="0" i="0" smtClean="0">
-                          <a:latin typeface="Courier" pitchFamily="2" charset="0"/>
-                        </a:rPr>
-                        <m:t> </m:t>
-                      </m:r>
-                    </m:oMath>
-                  </m:oMathPara>
-                </a14:m>
-                <a:endParaRPr lang="en-US" sz="1300" b="0" i="0" dirty="0">
-                  <a:latin typeface="Courier" pitchFamily="2" charset="0"/>
-                </a:endParaRPr>
-              </a:p>
-              <a:p>
-                <a:pPr marL="0" indent="0">
-                  <a:buNone/>
-                </a:pPr>
-                <a14:m>
-                  <m:oMathPara xmlns:m="http://schemas.openxmlformats.org/officeDocument/2006/math">
-                    <m:oMathParaPr>
-                      <m:jc m:val="centerGroup"/>
-                    </m:oMathParaPr>
-                    <m:oMath xmlns:m="http://schemas.openxmlformats.org/officeDocument/2006/math">
-                      <m:r>
-                        <a:rPr lang="en-US" sz="1300" b="0" i="1" smtClean="0">
-                          <a:latin typeface="Cambria Math" panose="02040503050406030204" pitchFamily="18" charset="0"/>
-                        </a:rPr>
-                        <m:t>–</m:t>
-                      </m:r>
-                      <m:r>
-                        <m:rPr>
-                          <m:nor/>
-                        </m:rPr>
-                        <a:rPr lang="en-US" sz="1300" b="0" i="0" smtClean="0">
-                          <a:latin typeface="Courier" pitchFamily="2" charset="0"/>
-                        </a:rPr>
-                        <m:t> 0.0296</m:t>
-                      </m:r>
-                      <m:r>
-                        <m:rPr>
-                          <m:nor/>
-                        </m:rPr>
-                        <a:rPr lang="en-US" sz="1300" b="0" i="0" smtClean="0">
-                          <a:latin typeface="Courier" pitchFamily="2" charset="0"/>
-                        </a:rPr>
-                        <m:t>June</m:t>
-                      </m:r>
-                      <m:r>
-                        <m:rPr>
-                          <m:nor/>
-                        </m:rPr>
-                        <a:rPr lang="en-US" sz="1300" b="0" i="0" smtClean="0">
-                          <a:latin typeface="Courier" pitchFamily="2" charset="0"/>
-                        </a:rPr>
-                        <m:t> </m:t>
-                      </m:r>
-                    </m:oMath>
-                  </m:oMathPara>
-                </a14:m>
-                <a:endParaRPr lang="en-US" sz="1300" b="0" i="0" dirty="0">
-                  <a:latin typeface="Courier" pitchFamily="2" charset="0"/>
-                </a:endParaRPr>
-              </a:p>
-              <a:p>
-                <a:pPr marL="0" indent="0">
-                  <a:buNone/>
-                </a:pPr>
-                <a14:m>
-                  <m:oMathPara xmlns:m="http://schemas.openxmlformats.org/officeDocument/2006/math">
-                    <m:oMathParaPr>
-                      <m:jc m:val="centerGroup"/>
-                    </m:oMathParaPr>
-                    <m:oMath xmlns:m="http://schemas.openxmlformats.org/officeDocument/2006/math">
-                      <m:r>
-                        <a:rPr lang="en-US" sz="1300" b="0" i="1" smtClean="0">
-                          <a:latin typeface="Cambria Math" panose="02040503050406030204" pitchFamily="18" charset="0"/>
-                        </a:rPr>
-                        <m:t>–</m:t>
-                      </m:r>
-                      <m:r>
-                        <m:rPr>
-                          <m:nor/>
-                        </m:rPr>
-                        <a:rPr lang="en-US" sz="1300" b="0" i="0" smtClean="0">
-                          <a:latin typeface="Courier" pitchFamily="2" charset="0"/>
-                        </a:rPr>
-                        <m:t> 0.0638</m:t>
-                      </m:r>
-                      <m:r>
-                        <m:rPr>
-                          <m:nor/>
-                        </m:rPr>
-                        <a:rPr lang="en-US" sz="1300" b="0" i="0" smtClean="0">
-                          <a:latin typeface="Courier" pitchFamily="2" charset="0"/>
-                        </a:rPr>
-                        <m:t>March</m:t>
-                      </m:r>
-                      <m:r>
-                        <m:rPr>
-                          <m:nor/>
-                        </m:rPr>
-                        <a:rPr lang="en-US" sz="1300" b="0" i="0" smtClean="0">
-                          <a:latin typeface="Courier" pitchFamily="2" charset="0"/>
-                        </a:rPr>
-                        <m:t> </m:t>
-                      </m:r>
-                    </m:oMath>
-                  </m:oMathPara>
-                </a14:m>
-                <a:endParaRPr lang="en-US" sz="1300" b="0" i="0" dirty="0">
-                  <a:latin typeface="Courier" pitchFamily="2" charset="0"/>
-                </a:endParaRPr>
-              </a:p>
-              <a:p>
-                <a:pPr marL="0" indent="0">
-                  <a:buNone/>
-                </a:pPr>
-                <a14:m>
-                  <m:oMathPara xmlns:m="http://schemas.openxmlformats.org/officeDocument/2006/math">
-                    <m:oMathParaPr>
-                      <m:jc m:val="centerGroup"/>
-                    </m:oMathParaPr>
-                    <m:oMath xmlns:m="http://schemas.openxmlformats.org/officeDocument/2006/math">
-                      <m:r>
-                        <a:rPr lang="en-US" sz="1300" b="0" i="1" smtClean="0">
-                          <a:latin typeface="Cambria Math" panose="02040503050406030204" pitchFamily="18" charset="0"/>
-                        </a:rPr>
-                        <m:t>–</m:t>
-                      </m:r>
-                      <m:r>
-                        <m:rPr>
-                          <m:nor/>
-                        </m:rPr>
-                        <a:rPr lang="en-US" sz="1300" b="0" i="0" smtClean="0">
-                          <a:latin typeface="Courier" pitchFamily="2" charset="0"/>
-                        </a:rPr>
-                        <m:t> 0.1692</m:t>
-                      </m:r>
-                      <m:r>
-                        <m:rPr>
-                          <m:nor/>
-                        </m:rPr>
-                        <a:rPr lang="en-US" sz="1300" b="0" i="0" smtClean="0">
-                          <a:latin typeface="Courier" pitchFamily="2" charset="0"/>
-                        </a:rPr>
-                        <m:t>May</m:t>
-                      </m:r>
-                      <m:r>
-                        <m:rPr>
-                          <m:nor/>
-                        </m:rPr>
-                        <a:rPr lang="en-US" sz="1300" b="0" i="0" smtClean="0">
-                          <a:latin typeface="Courier" pitchFamily="2" charset="0"/>
-                        </a:rPr>
-                        <m:t> </m:t>
-                      </m:r>
-                    </m:oMath>
-                  </m:oMathPara>
-                </a14:m>
-                <a:endParaRPr lang="en-US" sz="1300" b="0" i="0" dirty="0">
-                  <a:latin typeface="Courier" pitchFamily="2" charset="0"/>
-                </a:endParaRPr>
-              </a:p>
-              <a:p>
-                <a:pPr marL="0" indent="0">
-                  <a:buNone/>
-                </a:pPr>
-                <a14:m>
-                  <m:oMathPara xmlns:m="http://schemas.openxmlformats.org/officeDocument/2006/math">
-                    <m:oMathParaPr>
-                      <m:jc m:val="centerGroup"/>
-                    </m:oMathParaPr>
-                    <m:oMath xmlns:m="http://schemas.openxmlformats.org/officeDocument/2006/math">
-                      <m:r>
-                        <a:rPr lang="en-US" sz="1300" b="0" i="1" smtClean="0">
-                          <a:latin typeface="Cambria Math" panose="02040503050406030204" pitchFamily="18" charset="0"/>
-                        </a:rPr>
-                        <m:t>+</m:t>
-                      </m:r>
-                      <m:r>
-                        <m:rPr>
-                          <m:nor/>
-                        </m:rPr>
-                        <a:rPr lang="en-US" sz="1300" b="0" i="0" smtClean="0">
-                          <a:latin typeface="Courier" pitchFamily="2" charset="0"/>
-                        </a:rPr>
-                        <m:t> 0.06582</m:t>
-                      </m:r>
-                      <m:r>
-                        <m:rPr>
-                          <m:nor/>
-                        </m:rPr>
-                        <a:rPr lang="en-US" sz="1300" b="0" i="0" smtClean="0">
-                          <a:latin typeface="Courier" pitchFamily="2" charset="0"/>
-                        </a:rPr>
-                        <m:t>November</m:t>
-                      </m:r>
-                      <m:r>
-                        <m:rPr>
-                          <m:nor/>
-                        </m:rPr>
-                        <a:rPr lang="en-US" sz="1300" b="0" i="0" smtClean="0">
-                          <a:latin typeface="Courier" pitchFamily="2" charset="0"/>
-                        </a:rPr>
-                        <m:t> </m:t>
-                      </m:r>
-                    </m:oMath>
-                  </m:oMathPara>
-                </a14:m>
-                <a:endParaRPr lang="en-US" sz="1300" b="0" i="0" dirty="0">
-                  <a:latin typeface="Courier" pitchFamily="2" charset="0"/>
-                </a:endParaRPr>
-              </a:p>
-              <a:p>
-                <a:pPr marL="0" indent="0">
-                  <a:buNone/>
-                </a:pPr>
-                <a14:m>
-                  <m:oMathPara xmlns:m="http://schemas.openxmlformats.org/officeDocument/2006/math">
-                    <m:oMathParaPr>
-                      <m:jc m:val="centerGroup"/>
-                    </m:oMathParaPr>
-                    <m:oMath xmlns:m="http://schemas.openxmlformats.org/officeDocument/2006/math">
-                      <m:r>
-                        <a:rPr lang="en-US" sz="1300" b="0" i="1" smtClean="0">
-                          <a:latin typeface="Cambria Math" panose="02040503050406030204" pitchFamily="18" charset="0"/>
-                        </a:rPr>
-                        <m:t>+</m:t>
-                      </m:r>
-                      <m:r>
-                        <m:rPr>
-                          <m:nor/>
-                        </m:rPr>
-                        <a:rPr lang="en-US" sz="1300" b="0" i="0" smtClean="0">
-                          <a:latin typeface="Courier" pitchFamily="2" charset="0"/>
-                        </a:rPr>
-                        <m:t> 0.0294</m:t>
-                      </m:r>
-                      <m:r>
-                        <m:rPr>
-                          <m:nor/>
-                        </m:rPr>
-                        <a:rPr lang="en-US" sz="1300" b="0" i="0" smtClean="0">
-                          <a:latin typeface="Courier" pitchFamily="2" charset="0"/>
-                        </a:rPr>
-                        <m:t>October</m:t>
-                      </m:r>
-                      <m:r>
-                        <m:rPr>
-                          <m:nor/>
-                        </m:rPr>
-                        <a:rPr lang="en-US" sz="1300" b="0" i="0" smtClean="0">
-                          <a:latin typeface="Courier" pitchFamily="2" charset="0"/>
-                        </a:rPr>
-                        <m:t> </m:t>
-                      </m:r>
-                    </m:oMath>
-                  </m:oMathPara>
-                </a14:m>
-                <a:endParaRPr lang="en-US" sz="1300" b="0" i="0" dirty="0">
-                  <a:latin typeface="Courier" pitchFamily="2" charset="0"/>
-                </a:endParaRPr>
-              </a:p>
-              <a:p>
-                <a:pPr marL="0" indent="0">
-                  <a:buNone/>
-                </a:pPr>
-                <a14:m>
-                  <m:oMathPara xmlns:m="http://schemas.openxmlformats.org/officeDocument/2006/math">
-                    <m:oMathParaPr>
-                      <m:jc m:val="centerGroup"/>
-                    </m:oMathParaPr>
-                    <m:oMath xmlns:m="http://schemas.openxmlformats.org/officeDocument/2006/math">
-                      <m:r>
-                        <a:rPr lang="en-US" sz="1300" b="0" i="1" smtClean="0">
-                          <a:latin typeface="Cambria Math" panose="02040503050406030204" pitchFamily="18" charset="0"/>
-                        </a:rPr>
-                        <m:t>+</m:t>
-                      </m:r>
-                      <m:r>
-                        <m:rPr>
-                          <m:nor/>
-                        </m:rPr>
-                        <a:rPr lang="en-US" sz="1300" b="0" i="0" smtClean="0">
-                          <a:latin typeface="Courier" pitchFamily="2" charset="0"/>
-                        </a:rPr>
-                        <m:t> 0.005259</m:t>
-                      </m:r>
-                      <m:r>
-                        <m:rPr>
-                          <m:nor/>
-                        </m:rPr>
-                        <a:rPr lang="en-US" sz="1300" b="0" i="0" smtClean="0">
-                          <a:latin typeface="Courier" pitchFamily="2" charset="0"/>
-                        </a:rPr>
-                        <m:t>September</m:t>
-                      </m:r>
-                      <m:r>
-                        <m:rPr>
-                          <m:nor/>
-                        </m:rPr>
-                        <a:rPr lang="en-US" sz="1300" b="0" i="0" smtClean="0">
-                          <a:latin typeface="Courier" pitchFamily="2" charset="0"/>
-                        </a:rPr>
-                        <m:t> </m:t>
-                      </m:r>
-                    </m:oMath>
-                  </m:oMathPara>
-                </a14:m>
-                <a:endParaRPr lang="en-US" sz="1300" b="0" i="0" dirty="0">
-                  <a:latin typeface="Courier" pitchFamily="2" charset="0"/>
-                </a:endParaRPr>
-              </a:p>
-              <a:p>
-                <a:pPr marL="0" indent="0">
-                  <a:buNone/>
-                </a:pPr>
-                <a14:m>
-                  <m:oMathPara xmlns:m="http://schemas.openxmlformats.org/officeDocument/2006/math">
-                    <m:oMathParaPr>
-                      <m:jc m:val="centerGroup"/>
-                    </m:oMathParaPr>
-                    <m:oMath xmlns:m="http://schemas.openxmlformats.org/officeDocument/2006/math">
-                      <m:r>
-                        <a:rPr lang="en-US" sz="1300" b="0" i="1" smtClean="0">
-                          <a:latin typeface="Cambria Math" panose="02040503050406030204" pitchFamily="18" charset="0"/>
-                        </a:rPr>
-                        <m:t>+</m:t>
-                      </m:r>
-                      <m:r>
-                        <m:rPr>
-                          <m:nor/>
-                        </m:rPr>
-                        <a:rPr lang="en-US" sz="1300" b="0" i="0" smtClean="0">
-                          <a:latin typeface="Courier" pitchFamily="2" charset="0"/>
-                        </a:rPr>
-                        <m:t> 0.3251</m:t>
-                      </m:r>
-                      <m:r>
-                        <m:rPr>
-                          <m:nor/>
-                        </m:rPr>
-                        <a:rPr lang="en-US" sz="1300" b="0" i="0" smtClean="0">
-                          <a:latin typeface="Courier" pitchFamily="2" charset="0"/>
-                        </a:rPr>
-                        <m:t>Adventure</m:t>
-                      </m:r>
-                      <m:r>
-                        <m:rPr>
-                          <m:nor/>
-                        </m:rPr>
-                        <a:rPr lang="en-US" sz="1300" b="0" i="0" smtClean="0">
-                          <a:latin typeface="Courier" pitchFamily="2" charset="0"/>
-                        </a:rPr>
-                        <m:t> </m:t>
-                      </m:r>
-                    </m:oMath>
-                  </m:oMathPara>
-                </a14:m>
-                <a:endParaRPr lang="en-US" sz="1300" b="0" i="0" dirty="0">
-                  <a:latin typeface="Courier" pitchFamily="2" charset="0"/>
-                </a:endParaRPr>
-              </a:p>
-              <a:p>
-                <a:pPr marL="0" indent="0">
-                  <a:buNone/>
-                </a:pPr>
-                <a14:m>
-                  <m:oMathPara xmlns:m="http://schemas.openxmlformats.org/officeDocument/2006/math">
-                    <m:oMathParaPr>
-                      <m:jc m:val="centerGroup"/>
-                    </m:oMathParaPr>
-                    <m:oMath xmlns:m="http://schemas.openxmlformats.org/officeDocument/2006/math">
-                      <m:r>
-                        <m:rPr>
-                          <m:nor/>
-                        </m:rPr>
-                        <a:rPr lang="en-US" sz="1300" b="0" i="0" smtClean="0">
-                          <a:latin typeface="Courier" pitchFamily="2" charset="0"/>
-                        </a:rPr>
-                        <m:t>+ 0.8829</m:t>
-                      </m:r>
-                      <m:r>
-                        <m:rPr>
-                          <m:nor/>
-                        </m:rPr>
-                        <a:rPr lang="en-US" sz="1300" b="0" i="0" smtClean="0">
-                          <a:latin typeface="Courier" pitchFamily="2" charset="0"/>
-                        </a:rPr>
-                        <m:t>Animation</m:t>
-                      </m:r>
-                      <m:r>
-                        <m:rPr>
-                          <m:nor/>
-                        </m:rPr>
-                        <a:rPr lang="en-US" sz="1300" b="0" i="0" smtClean="0">
-                          <a:latin typeface="Courier" pitchFamily="2" charset="0"/>
-                        </a:rPr>
-                        <m:t> </m:t>
-                      </m:r>
-                    </m:oMath>
-                  </m:oMathPara>
-                </a14:m>
-                <a:endParaRPr lang="en-US" sz="1300" b="0" i="0" dirty="0">
-                  <a:latin typeface="Courier" pitchFamily="2" charset="0"/>
-                </a:endParaRPr>
-              </a:p>
-              <a:p>
-                <a:pPr marL="0" indent="0">
-                  <a:buNone/>
-                </a:pPr>
-                <a14:m>
-                  <m:oMathPara xmlns:m="http://schemas.openxmlformats.org/officeDocument/2006/math">
-                    <m:oMathParaPr>
-                      <m:jc m:val="centerGroup"/>
-                    </m:oMathParaPr>
-                    <m:oMath xmlns:m="http://schemas.openxmlformats.org/officeDocument/2006/math">
-                      <m:r>
-                        <m:rPr>
-                          <m:nor/>
-                        </m:rPr>
-                        <a:rPr lang="en-US" sz="1300" b="0" i="0" smtClean="0">
-                          <a:latin typeface="Courier" pitchFamily="2" charset="0"/>
-                        </a:rPr>
-                        <m:t>+ 0.7957</m:t>
-                      </m:r>
-                      <m:r>
-                        <m:rPr>
-                          <m:nor/>
-                        </m:rPr>
-                        <a:rPr lang="en-US" sz="1300" b="0" i="0" smtClean="0">
-                          <a:latin typeface="Courier" pitchFamily="2" charset="0"/>
-                        </a:rPr>
-                        <m:t>Biography</m:t>
-                      </m:r>
-                      <m:r>
-                        <m:rPr>
-                          <m:nor/>
-                        </m:rPr>
-                        <a:rPr lang="en-US" sz="1300" b="0" i="0" smtClean="0">
-                          <a:latin typeface="Courier" pitchFamily="2" charset="0"/>
-                        </a:rPr>
-                        <m:t> </m:t>
-                      </m:r>
-                    </m:oMath>
-                  </m:oMathPara>
-                </a14:m>
-                <a:endParaRPr lang="en-US" sz="1300" b="0" i="0" dirty="0">
-                  <a:latin typeface="Courier" pitchFamily="2" charset="0"/>
-                </a:endParaRPr>
-              </a:p>
-              <a:p>
-                <a:pPr marL="0" indent="0">
-                  <a:buNone/>
-                </a:pPr>
-                <a14:m>
-                  <m:oMathPara xmlns:m="http://schemas.openxmlformats.org/officeDocument/2006/math">
-                    <m:oMathParaPr>
-                      <m:jc m:val="centerGroup"/>
-                    </m:oMathParaPr>
-                    <m:oMath xmlns:m="http://schemas.openxmlformats.org/officeDocument/2006/math">
-                      <m:r>
-                        <m:rPr>
-                          <m:nor/>
-                        </m:rPr>
-                        <a:rPr lang="en-US" sz="1300" b="0" i="0" smtClean="0">
-                          <a:latin typeface="Courier" pitchFamily="2" charset="0"/>
-                        </a:rPr>
-                        <m:t>+ 0.2936</m:t>
-                      </m:r>
-                      <m:r>
-                        <m:rPr>
-                          <m:nor/>
-                        </m:rPr>
-                        <a:rPr lang="en-US" sz="1300" b="0" i="0" smtClean="0">
-                          <a:latin typeface="Courier" pitchFamily="2" charset="0"/>
-                        </a:rPr>
-                        <m:t>Comedy</m:t>
-                      </m:r>
-                      <m:r>
-                        <m:rPr>
-                          <m:nor/>
-                        </m:rPr>
-                        <a:rPr lang="en-US" sz="1300" b="0" i="0" smtClean="0">
-                          <a:latin typeface="Courier" pitchFamily="2" charset="0"/>
-                        </a:rPr>
-                        <m:t> </m:t>
-                      </m:r>
-                    </m:oMath>
-                  </m:oMathPara>
-                </a14:m>
-                <a:endParaRPr lang="en-US" sz="1300" b="0" i="0" dirty="0">
-                  <a:latin typeface="Courier" pitchFamily="2" charset="0"/>
-                </a:endParaRPr>
-              </a:p>
-              <a:p>
-                <a:pPr marL="0" indent="0">
-                  <a:buNone/>
-                </a:pPr>
-                <a14:m>
-                  <m:oMathPara xmlns:m="http://schemas.openxmlformats.org/officeDocument/2006/math">
-                    <m:oMathParaPr>
-                      <m:jc m:val="centerGroup"/>
-                    </m:oMathParaPr>
-                    <m:oMath xmlns:m="http://schemas.openxmlformats.org/officeDocument/2006/math">
-                      <m:r>
-                        <m:rPr>
-                          <m:nor/>
-                        </m:rPr>
-                        <a:rPr lang="en-US" sz="1300" b="0" i="0" smtClean="0">
-                          <a:latin typeface="Courier" pitchFamily="2" charset="0"/>
-                        </a:rPr>
-                        <m:t>+ 0.3785</m:t>
-                      </m:r>
-                      <m:r>
-                        <m:rPr>
-                          <m:nor/>
-                        </m:rPr>
-                        <a:rPr lang="en-US" sz="1300" b="0" i="0" smtClean="0">
-                          <a:latin typeface="Courier" pitchFamily="2" charset="0"/>
-                        </a:rPr>
-                        <m:t>Crime</m:t>
-                      </m:r>
-                      <m:r>
-                        <m:rPr>
-                          <m:nor/>
-                        </m:rPr>
-                        <a:rPr lang="en-US" sz="1300" b="0" i="0" smtClean="0">
-                          <a:latin typeface="Courier" pitchFamily="2" charset="0"/>
-                        </a:rPr>
-                        <m:t> </m:t>
-                      </m:r>
-                    </m:oMath>
-                  </m:oMathPara>
-                </a14:m>
-                <a:endParaRPr lang="en-US" sz="1300" b="0" i="0" dirty="0">
-                  <a:latin typeface="Courier" pitchFamily="2" charset="0"/>
-                </a:endParaRPr>
-              </a:p>
-              <a:p>
-                <a:pPr marL="0" indent="0">
-                  <a:buNone/>
-                </a:pPr>
-                <a14:m>
-                  <m:oMathPara xmlns:m="http://schemas.openxmlformats.org/officeDocument/2006/math">
-                    <m:oMathParaPr>
-                      <m:jc m:val="centerGroup"/>
-                    </m:oMathParaPr>
-                    <m:oMath xmlns:m="http://schemas.openxmlformats.org/officeDocument/2006/math">
-                      <m:r>
-                        <m:rPr>
-                          <m:nor/>
-                        </m:rPr>
-                        <a:rPr lang="en-US" sz="1300" b="0" i="0" smtClean="0">
-                          <a:latin typeface="Courier" pitchFamily="2" charset="0"/>
-                        </a:rPr>
-                        <m:t>+ 0.5407</m:t>
-                      </m:r>
-                      <m:r>
-                        <m:rPr>
-                          <m:nor/>
-                        </m:rPr>
-                        <a:rPr lang="en-US" sz="1300" b="0" i="0" smtClean="0">
-                          <a:latin typeface="Courier" pitchFamily="2" charset="0"/>
-                        </a:rPr>
-                        <m:t>Drama</m:t>
-                      </m:r>
-                      <m:r>
-                        <m:rPr>
-                          <m:nor/>
-                        </m:rPr>
-                        <a:rPr lang="en-US" sz="1300" b="0" i="0" smtClean="0">
-                          <a:latin typeface="Courier" pitchFamily="2" charset="0"/>
-                        </a:rPr>
-                        <m:t> </m:t>
-                      </m:r>
-                    </m:oMath>
-                  </m:oMathPara>
-                </a14:m>
-                <a:endParaRPr lang="en-US" sz="1300" b="0" i="0" dirty="0">
-                  <a:latin typeface="Courier" pitchFamily="2" charset="0"/>
-                </a:endParaRPr>
-              </a:p>
-              <a:p>
-                <a:pPr marL="0" indent="0">
-                  <a:buNone/>
-                </a:pPr>
-                <a14:m>
-                  <m:oMathPara xmlns:m="http://schemas.openxmlformats.org/officeDocument/2006/math">
-                    <m:oMathParaPr>
-                      <m:jc m:val="centerGroup"/>
-                    </m:oMathParaPr>
-                    <m:oMath xmlns:m="http://schemas.openxmlformats.org/officeDocument/2006/math">
-                      <m:r>
-                        <m:rPr>
-                          <m:nor/>
-                        </m:rPr>
-                        <a:rPr lang="en-US" sz="1300" b="0" i="0" smtClean="0">
-                          <a:latin typeface="Courier" pitchFamily="2" charset="0"/>
-                        </a:rPr>
-                        <m:t>− 0.3144</m:t>
-                      </m:r>
-                      <m:r>
-                        <m:rPr>
-                          <m:nor/>
-                        </m:rPr>
-                        <a:rPr lang="en-US" sz="1300" b="0" i="0" smtClean="0">
-                          <a:latin typeface="Courier" pitchFamily="2" charset="0"/>
-                        </a:rPr>
-                        <m:t>Family</m:t>
-                      </m:r>
-                      <m:r>
-                        <m:rPr>
-                          <m:nor/>
-                        </m:rPr>
-                        <a:rPr lang="en-US" sz="1300" b="0" i="0" smtClean="0">
-                          <a:latin typeface="Courier" pitchFamily="2" charset="0"/>
-                        </a:rPr>
-                        <m:t> </m:t>
-                      </m:r>
-                    </m:oMath>
-                  </m:oMathPara>
-                </a14:m>
-                <a:endParaRPr lang="en-US" sz="1300" b="0" i="0" dirty="0">
-                  <a:latin typeface="Courier" pitchFamily="2" charset="0"/>
-                </a:endParaRPr>
-              </a:p>
-              <a:p>
-                <a:pPr marL="0" indent="0">
-                  <a:buNone/>
-                </a:pPr>
-                <a14:m>
-                  <m:oMathPara xmlns:m="http://schemas.openxmlformats.org/officeDocument/2006/math">
-                    <m:oMathParaPr>
-                      <m:jc m:val="centerGroup"/>
-                    </m:oMathParaPr>
-                    <m:oMath xmlns:m="http://schemas.openxmlformats.org/officeDocument/2006/math">
-                      <m:r>
-                        <m:rPr>
-                          <m:nor/>
-                        </m:rPr>
-                        <a:rPr lang="en-US" sz="1300" b="0" i="0" smtClean="0">
-                          <a:latin typeface="Courier" pitchFamily="2" charset="0"/>
-                        </a:rPr>
-                        <m:t>− 0.42562</m:t>
-                      </m:r>
-                      <m:r>
-                        <m:rPr>
-                          <m:nor/>
-                        </m:rPr>
-                        <a:rPr lang="en-US" sz="1300" b="0" i="0" smtClean="0">
-                          <a:latin typeface="Courier" pitchFamily="2" charset="0"/>
-                        </a:rPr>
-                        <m:t>Fantasy</m:t>
-                      </m:r>
-                      <m:r>
-                        <m:rPr>
-                          <m:nor/>
-                        </m:rPr>
-                        <a:rPr lang="en-US" sz="1300" b="0" i="0" smtClean="0">
-                          <a:latin typeface="Courier" pitchFamily="2" charset="0"/>
-                        </a:rPr>
-                        <m:t> </m:t>
-                      </m:r>
-                    </m:oMath>
-                  </m:oMathPara>
-                </a14:m>
-                <a:endParaRPr lang="en-US" sz="1300" b="0" i="0" dirty="0">
-                  <a:latin typeface="Courier" pitchFamily="2" charset="0"/>
-                </a:endParaRPr>
-              </a:p>
-              <a:p>
-                <a:pPr marL="0" indent="0">
-                  <a:buNone/>
-                </a:pPr>
-                <a14:m>
-                  <m:oMathPara xmlns:m="http://schemas.openxmlformats.org/officeDocument/2006/math">
-                    <m:oMathParaPr>
-                      <m:jc m:val="centerGroup"/>
-                    </m:oMathParaPr>
-                    <m:oMath xmlns:m="http://schemas.openxmlformats.org/officeDocument/2006/math">
-                      <m:r>
-                        <a:rPr lang="en-US" sz="1300" b="0" i="1" smtClean="0">
-                          <a:latin typeface="Cambria Math" panose="02040503050406030204" pitchFamily="18" charset="0"/>
-                        </a:rPr>
-                        <m:t>–</m:t>
-                      </m:r>
-                      <m:r>
-                        <m:rPr>
-                          <m:nor/>
-                        </m:rPr>
-                        <a:rPr lang="en-US" sz="1300" b="0" i="0" smtClean="0">
-                          <a:latin typeface="Courier" pitchFamily="2" charset="0"/>
-                        </a:rPr>
-                        <m:t> 0.08323</m:t>
-                      </m:r>
-                      <m:r>
-                        <m:rPr>
-                          <m:nor/>
-                        </m:rPr>
-                        <a:rPr lang="en-US" sz="1300" b="0" i="0" smtClean="0">
-                          <a:latin typeface="Courier" pitchFamily="2" charset="0"/>
-                        </a:rPr>
-                        <m:t>Horror</m:t>
-                      </m:r>
-                      <m:r>
-                        <m:rPr>
-                          <m:nor/>
-                        </m:rPr>
-                        <a:rPr lang="en-US" sz="1300" b="0" i="0" smtClean="0">
-                          <a:latin typeface="Courier" pitchFamily="2" charset="0"/>
-                        </a:rPr>
-                        <m:t> </m:t>
-                      </m:r>
-                    </m:oMath>
-                  </m:oMathPara>
-                </a14:m>
-                <a:endParaRPr lang="en-US" sz="1300" b="0" i="0" dirty="0">
-                  <a:latin typeface="Courier" pitchFamily="2" charset="0"/>
-                </a:endParaRPr>
-              </a:p>
-              <a:p>
-                <a:pPr marL="0" indent="0">
-                  <a:buNone/>
-                </a:pPr>
-                <a14:m>
-                  <m:oMathPara xmlns:m="http://schemas.openxmlformats.org/officeDocument/2006/math">
-                    <m:oMathParaPr>
-                      <m:jc m:val="centerGroup"/>
-                    </m:oMathParaPr>
-                    <m:oMath xmlns:m="http://schemas.openxmlformats.org/officeDocument/2006/math">
-                      <m:r>
-                        <m:rPr>
-                          <m:nor/>
-                        </m:rPr>
-                        <a:rPr lang="en-US" sz="1300" b="0" i="0" smtClean="0">
-                          <a:latin typeface="Courier" pitchFamily="2" charset="0"/>
-                        </a:rPr>
-                        <m:t>+ 1.6462</m:t>
-                      </m:r>
-                      <m:r>
-                        <m:rPr>
-                          <m:nor/>
-                        </m:rPr>
-                        <a:rPr lang="en-US" sz="1300" b="0" i="0" smtClean="0">
-                          <a:latin typeface="Courier" pitchFamily="2" charset="0"/>
-                        </a:rPr>
-                        <m:t>Music</m:t>
-                      </m:r>
-                      <m:r>
-                        <m:rPr>
-                          <m:nor/>
-                        </m:rPr>
-                        <a:rPr lang="en-US" sz="1300" b="0" i="0" smtClean="0">
-                          <a:latin typeface="Courier" pitchFamily="2" charset="0"/>
-                        </a:rPr>
-                        <m:t> </m:t>
-                      </m:r>
-                    </m:oMath>
-                  </m:oMathPara>
-                </a14:m>
-                <a:endParaRPr lang="en-US" sz="1300" b="0" i="0" dirty="0">
-                  <a:latin typeface="Courier" pitchFamily="2" charset="0"/>
-                </a:endParaRPr>
-              </a:p>
-              <a:p>
-                <a:pPr marL="0" indent="0">
-                  <a:buNone/>
-                </a:pPr>
-                <a14:m>
-                  <m:oMathPara xmlns:m="http://schemas.openxmlformats.org/officeDocument/2006/math">
-                    <m:oMathParaPr>
-                      <m:jc m:val="centerGroup"/>
-                    </m:oMathParaPr>
-                    <m:oMath xmlns:m="http://schemas.openxmlformats.org/officeDocument/2006/math">
-                      <m:r>
-                        <m:rPr>
-                          <m:nor/>
-                        </m:rPr>
-                        <a:rPr lang="en-US" sz="1300" b="0" i="0" smtClean="0">
-                          <a:latin typeface="Courier" pitchFamily="2" charset="0"/>
-                        </a:rPr>
-                        <m:t>+ 2.198</m:t>
-                      </m:r>
-                      <m:r>
-                        <m:rPr>
-                          <m:nor/>
-                        </m:rPr>
-                        <a:rPr lang="en-US" sz="1300" b="0" i="0" smtClean="0">
-                          <a:latin typeface="Courier" pitchFamily="2" charset="0"/>
-                        </a:rPr>
-                        <m:t>Musical</m:t>
-                      </m:r>
-                      <m:r>
-                        <m:rPr>
-                          <m:nor/>
-                        </m:rPr>
-                        <a:rPr lang="en-US" sz="1300" b="0" i="0" smtClean="0">
-                          <a:latin typeface="Courier" pitchFamily="2" charset="0"/>
-                        </a:rPr>
-                        <m:t> </m:t>
-                      </m:r>
-                    </m:oMath>
-                  </m:oMathPara>
-                </a14:m>
-                <a:endParaRPr lang="en-US" sz="1300" b="0" i="0" dirty="0">
-                  <a:latin typeface="Courier" pitchFamily="2" charset="0"/>
-                </a:endParaRPr>
-              </a:p>
-              <a:p>
-                <a:pPr marL="0" indent="0">
-                  <a:buNone/>
-                </a:pPr>
-                <a14:m>
-                  <m:oMathPara xmlns:m="http://schemas.openxmlformats.org/officeDocument/2006/math">
-                    <m:oMathParaPr>
-                      <m:jc m:val="centerGroup"/>
-                    </m:oMathParaPr>
-                    <m:oMath xmlns:m="http://schemas.openxmlformats.org/officeDocument/2006/math">
-                      <m:r>
-                        <m:rPr>
-                          <m:nor/>
-                        </m:rPr>
-                        <a:rPr lang="en-US" sz="1300" b="0" i="0" smtClean="0">
-                          <a:latin typeface="Courier" pitchFamily="2" charset="0"/>
-                        </a:rPr>
-                        <m:t>+ 1.003</m:t>
-                      </m:r>
-                      <m:r>
-                        <m:rPr>
-                          <m:nor/>
-                        </m:rPr>
-                        <a:rPr lang="en-US" sz="1300" b="0" i="0" smtClean="0">
-                          <a:latin typeface="Courier" pitchFamily="2" charset="0"/>
-                        </a:rPr>
-                        <m:t>Myster</m:t>
-                      </m:r>
-                      <m:r>
-                        <m:rPr>
-                          <m:nor/>
-                        </m:rPr>
-                        <a:rPr lang="en-US" sz="1300" b="0" i="0" smtClean="0">
-                          <a:latin typeface="Courier" pitchFamily="2" charset="0"/>
-                        </a:rPr>
-                        <m:t> </m:t>
-                      </m:r>
-                    </m:oMath>
-                  </m:oMathPara>
-                </a14:m>
-                <a:endParaRPr lang="en-US" sz="1300" b="0" i="0" dirty="0">
-                  <a:latin typeface="Courier" pitchFamily="2" charset="0"/>
-                </a:endParaRPr>
-              </a:p>
-              <a:p>
-                <a:pPr marL="0" indent="0">
-                  <a:buNone/>
-                </a:pPr>
-                <a14:m>
-                  <m:oMathPara xmlns:m="http://schemas.openxmlformats.org/officeDocument/2006/math">
-                    <m:oMathParaPr>
-                      <m:jc m:val="centerGroup"/>
-                    </m:oMathParaPr>
-                    <m:oMath xmlns:m="http://schemas.openxmlformats.org/officeDocument/2006/math">
-                      <m:r>
-                        <m:rPr>
-                          <m:nor/>
-                        </m:rPr>
-                        <a:rPr lang="en-US" sz="1300" b="0" i="0" smtClean="0">
-                          <a:latin typeface="Courier" pitchFamily="2" charset="0"/>
-                        </a:rPr>
-                        <m:t>+ 0.45469</m:t>
-                      </m:r>
-                      <m:r>
-                        <m:rPr>
-                          <m:nor/>
-                        </m:rPr>
-                        <a:rPr lang="en-US" sz="1300" b="0" i="0" smtClean="0">
-                          <a:latin typeface="Courier" pitchFamily="2" charset="0"/>
-                        </a:rPr>
-                        <m:t>Romance</m:t>
-                      </m:r>
-                      <m:r>
-                        <m:rPr>
-                          <m:nor/>
-                        </m:rPr>
-                        <a:rPr lang="en-US" sz="1300" b="0" i="0" smtClean="0">
-                          <a:latin typeface="Courier" pitchFamily="2" charset="0"/>
-                        </a:rPr>
-                        <m:t> </m:t>
-                      </m:r>
-                    </m:oMath>
-                  </m:oMathPara>
-                </a14:m>
-                <a:endParaRPr lang="en-US" sz="1300" b="0" i="0" dirty="0">
-                  <a:latin typeface="Courier" pitchFamily="2" charset="0"/>
-                </a:endParaRPr>
-              </a:p>
-              <a:p>
-                <a:pPr marL="0" indent="0">
-                  <a:buNone/>
-                </a:pPr>
-                <a14:m>
-                  <m:oMathPara xmlns:m="http://schemas.openxmlformats.org/officeDocument/2006/math">
-                    <m:oMathParaPr>
-                      <m:jc m:val="centerGroup"/>
-                    </m:oMathParaPr>
-                    <m:oMath xmlns:m="http://schemas.openxmlformats.org/officeDocument/2006/math">
-                      <m:r>
-                        <m:rPr>
-                          <m:nor/>
-                        </m:rPr>
-                        <a:rPr lang="en-US" sz="1300" b="0" i="0" smtClean="0">
-                          <a:latin typeface="Courier" pitchFamily="2" charset="0"/>
-                        </a:rPr>
-                        <m:t>+ 0.9918</m:t>
-                      </m:r>
-                      <m:r>
-                        <m:rPr>
-                          <m:nor/>
-                        </m:rPr>
-                        <a:rPr lang="en-US" sz="1300" b="0" i="0" smtClean="0">
-                          <a:latin typeface="Courier" pitchFamily="2" charset="0"/>
-                        </a:rPr>
-                        <m:t>Sci</m:t>
-                      </m:r>
-                      <m:r>
-                        <m:rPr>
-                          <m:nor/>
-                        </m:rPr>
-                        <a:rPr lang="en-US" sz="1300" b="0" i="0" smtClean="0">
-                          <a:latin typeface="Courier" pitchFamily="2" charset="0"/>
-                        </a:rPr>
-                        <m:t>−</m:t>
-                      </m:r>
-                      <m:r>
-                        <m:rPr>
-                          <m:nor/>
-                        </m:rPr>
-                        <a:rPr lang="en-US" sz="1300" b="0" i="0" smtClean="0">
-                          <a:latin typeface="Courier" pitchFamily="2" charset="0"/>
-                        </a:rPr>
-                        <m:t>Fi</m:t>
-                      </m:r>
-                      <m:r>
-                        <m:rPr>
-                          <m:nor/>
-                        </m:rPr>
-                        <a:rPr lang="en-US" sz="1300" b="0" i="0" smtClean="0">
-                          <a:latin typeface="Courier" pitchFamily="2" charset="0"/>
-                        </a:rPr>
-                        <m:t> </m:t>
-                      </m:r>
-                    </m:oMath>
-                  </m:oMathPara>
-                </a14:m>
-                <a:endParaRPr lang="en-US" sz="1300" b="0" i="0" dirty="0">
-                  <a:latin typeface="Courier" pitchFamily="2" charset="0"/>
-                </a:endParaRPr>
-              </a:p>
-              <a:p>
-                <a:pPr marL="0" indent="0">
-                  <a:buNone/>
-                </a:pPr>
-                <a14:m>
-                  <m:oMathPara xmlns:m="http://schemas.openxmlformats.org/officeDocument/2006/math">
-                    <m:oMathParaPr>
-                      <m:jc m:val="centerGroup"/>
-                    </m:oMathParaPr>
-                    <m:oMath xmlns:m="http://schemas.openxmlformats.org/officeDocument/2006/math">
-                      <m:r>
-                        <m:rPr>
-                          <m:nor/>
-                        </m:rPr>
-                        <a:rPr lang="en-US" sz="1300" b="0" i="0" smtClean="0">
-                          <a:latin typeface="Courier" pitchFamily="2" charset="0"/>
-                        </a:rPr>
-                        <m:t>+ 1.93200</m:t>
-                      </m:r>
-                      <m:r>
-                        <m:rPr>
-                          <m:nor/>
-                        </m:rPr>
-                        <a:rPr lang="en-US" sz="1300" b="0" i="0" smtClean="0">
-                          <a:latin typeface="Courier" pitchFamily="2" charset="0"/>
-                        </a:rPr>
-                        <m:t>Sport</m:t>
-                      </m:r>
-                      <m:r>
-                        <m:rPr>
-                          <m:nor/>
-                        </m:rPr>
-                        <a:rPr lang="en-US" sz="1300" b="0" i="0" smtClean="0">
-                          <a:latin typeface="Courier" pitchFamily="2" charset="0"/>
-                        </a:rPr>
-                        <m:t> </m:t>
-                      </m:r>
-                    </m:oMath>
-                  </m:oMathPara>
-                </a14:m>
-                <a:endParaRPr lang="en-US" sz="1300" b="0" i="0" dirty="0">
-                  <a:latin typeface="Courier" pitchFamily="2" charset="0"/>
-                </a:endParaRPr>
-              </a:p>
-              <a:p>
-                <a:pPr marL="0" indent="0">
-                  <a:buNone/>
-                </a:pPr>
-                <a14:m>
-                  <m:oMathPara xmlns:m="http://schemas.openxmlformats.org/officeDocument/2006/math">
-                    <m:oMathParaPr>
-                      <m:jc m:val="centerGroup"/>
-                    </m:oMathParaPr>
-                    <m:oMath xmlns:m="http://schemas.openxmlformats.org/officeDocument/2006/math">
-                      <m:r>
-                        <a:rPr lang="en-US" sz="1300" b="0" i="1" smtClean="0">
-                          <a:latin typeface="Cambria Math" panose="02040503050406030204" pitchFamily="18" charset="0"/>
-                        </a:rPr>
-                        <m:t>–</m:t>
-                      </m:r>
-                      <m:r>
-                        <m:rPr>
-                          <m:nor/>
-                        </m:rPr>
-                        <a:rPr lang="en-US" sz="1300" b="0" i="0" smtClean="0">
-                          <a:latin typeface="Courier" pitchFamily="2" charset="0"/>
-                        </a:rPr>
-                        <m:t> 0.53621</m:t>
-                      </m:r>
-                      <m:r>
-                        <m:rPr>
-                          <m:nor/>
-                        </m:rPr>
-                        <a:rPr lang="en-US" sz="1300" b="0" i="0" smtClean="0">
-                          <a:latin typeface="Courier" pitchFamily="2" charset="0"/>
-                        </a:rPr>
-                        <m:t>Thriller</m:t>
-                      </m:r>
-                      <m:r>
-                        <m:rPr>
-                          <m:nor/>
-                        </m:rPr>
-                        <a:rPr lang="en-US" sz="1300" b="0" i="0" smtClean="0">
-                          <a:latin typeface="Courier" pitchFamily="2" charset="0"/>
-                        </a:rPr>
-                        <m:t> </m:t>
-                      </m:r>
-                    </m:oMath>
-                  </m:oMathPara>
-                </a14:m>
-                <a:endParaRPr lang="en-US" sz="1300" b="0" i="0" dirty="0">
-                  <a:latin typeface="Courier" pitchFamily="2" charset="0"/>
-                </a:endParaRPr>
-              </a:p>
-              <a:p>
-                <a:pPr marL="0" indent="0">
-                  <a:buNone/>
-                </a:pPr>
-                <a14:m>
-                  <m:oMathPara xmlns:m="http://schemas.openxmlformats.org/officeDocument/2006/math">
-                    <m:oMathParaPr>
-                      <m:jc m:val="centerGroup"/>
-                    </m:oMathParaPr>
-                    <m:oMath xmlns:m="http://schemas.openxmlformats.org/officeDocument/2006/math">
-                      <m:r>
-                        <a:rPr lang="en-US" sz="1300" b="0" i="1" smtClean="0">
-                          <a:latin typeface="Cambria Math" panose="02040503050406030204" pitchFamily="18" charset="0"/>
-                        </a:rPr>
-                        <m:t>–</m:t>
-                      </m:r>
-                      <m:r>
-                        <m:rPr>
-                          <m:nor/>
-                        </m:rPr>
-                        <a:rPr lang="en-US" sz="1300" b="0" i="0" smtClean="0">
-                          <a:latin typeface="Courier" pitchFamily="2" charset="0"/>
-                        </a:rPr>
-                        <m:t> 1.778</m:t>
-                      </m:r>
-                      <m:r>
-                        <m:rPr>
-                          <m:nor/>
-                        </m:rPr>
-                        <a:rPr lang="en-US" sz="1300" b="0" i="0" smtClean="0">
-                          <a:latin typeface="Courier" pitchFamily="2" charset="0"/>
-                        </a:rPr>
-                        <m:t>Wester</m:t>
-                      </m:r>
-                      <m:r>
-                        <m:rPr>
-                          <m:nor/>
-                        </m:rPr>
-                        <a:rPr lang="en-US" sz="1300" b="0" i="0" smtClean="0">
-                          <a:latin typeface="Courier" pitchFamily="2" charset="0"/>
-                        </a:rPr>
-                        <m:t> </m:t>
-                      </m:r>
-                    </m:oMath>
-                  </m:oMathPara>
-                </a14:m>
-                <a:endParaRPr lang="en-US" sz="1300" b="0" i="0" dirty="0">
-                  <a:latin typeface="Courier" pitchFamily="2" charset="0"/>
-                </a:endParaRPr>
-              </a:p>
-              <a:p>
-                <a:pPr marL="0" indent="0">
-                  <a:buNone/>
-                </a:pPr>
-                <a14:m>
-                  <m:oMathPara xmlns:m="http://schemas.openxmlformats.org/officeDocument/2006/math">
-                    <m:oMathParaPr>
-                      <m:jc m:val="centerGroup"/>
-                    </m:oMathParaPr>
-                    <m:oMath xmlns:m="http://schemas.openxmlformats.org/officeDocument/2006/math">
-                      <m:r>
-                        <a:rPr lang="en-US" sz="1300" b="0" i="1" smtClean="0">
-                          <a:latin typeface="Cambria Math" panose="02040503050406030204" pitchFamily="18" charset="0"/>
-                        </a:rPr>
-                        <m:t>–</m:t>
-                      </m:r>
-                      <m:r>
-                        <m:rPr>
-                          <m:nor/>
-                        </m:rPr>
-                        <a:rPr lang="en-US" sz="1300" b="0" i="0" smtClean="0">
-                          <a:latin typeface="Courier" pitchFamily="2" charset="0"/>
-                        </a:rPr>
-                        <m:t> 1.146</m:t>
-                      </m:r>
-                      <m:r>
-                        <m:rPr>
-                          <m:nor/>
-                        </m:rPr>
-                        <a:rPr lang="en-US" sz="1300" b="0" i="0" smtClean="0">
-                          <a:latin typeface="Courier" pitchFamily="2" charset="0"/>
-                        </a:rPr>
-                        <m:t>PG</m:t>
-                      </m:r>
-                      <m:r>
-                        <m:rPr>
-                          <m:nor/>
-                        </m:rPr>
-                        <a:rPr lang="en-US" sz="1300" b="0" i="0" smtClean="0">
-                          <a:latin typeface="Courier" pitchFamily="2" charset="0"/>
-                        </a:rPr>
-                        <m:t> </m:t>
-                      </m:r>
-                    </m:oMath>
-                  </m:oMathPara>
-                </a14:m>
-                <a:endParaRPr lang="en-US" sz="1300" b="0" i="0" dirty="0">
-                  <a:latin typeface="Courier" pitchFamily="2" charset="0"/>
-                </a:endParaRPr>
-              </a:p>
-              <a:p>
-                <a:pPr marL="0" indent="0" algn="ctr">
-                  <a:buNone/>
-                </a:pPr>
-                <a14:m>
-                  <m:oMathPara xmlns:m="http://schemas.openxmlformats.org/officeDocument/2006/math">
-                    <m:oMathParaPr>
-                      <m:jc m:val="centerGroup"/>
-                    </m:oMathParaPr>
-                    <m:oMath xmlns:m="http://schemas.openxmlformats.org/officeDocument/2006/math">
-                      <m:r>
-                        <a:rPr lang="en-US" sz="1300" b="0" i="0" smtClean="0">
-                          <a:latin typeface="Cambria Math" panose="02040503050406030204" pitchFamily="18" charset="0"/>
-                        </a:rPr>
-                        <m:t>− </m:t>
-                      </m:r>
-                      <m:r>
-                        <m:rPr>
-                          <m:nor/>
-                        </m:rPr>
-                        <a:rPr lang="en-US" sz="1300" b="0" i="0" smtClean="0">
-                          <a:latin typeface="Courier" pitchFamily="2" charset="0"/>
-                        </a:rPr>
-                        <m:t>0.977</m:t>
-                      </m:r>
-                      <m:r>
-                        <m:rPr>
-                          <m:nor/>
-                        </m:rPr>
-                        <a:rPr lang="en-US" sz="1300" b="0" i="0" smtClean="0">
-                          <a:latin typeface="Courier" pitchFamily="2" charset="0"/>
-                        </a:rPr>
-                        <m:t>PG</m:t>
-                      </m:r>
-                      <m:r>
-                        <m:rPr>
-                          <m:nor/>
-                        </m:rPr>
-                        <a:rPr lang="en-US" sz="1300" b="0" i="0" smtClean="0">
-                          <a:latin typeface="Courier" pitchFamily="2" charset="0"/>
-                        </a:rPr>
-                        <m:t>−13 </m:t>
-                      </m:r>
-                    </m:oMath>
-                  </m:oMathPara>
-                </a14:m>
-                <a:endParaRPr lang="en-US" sz="1300" b="0" i="0" dirty="0">
-                  <a:latin typeface="Courier" pitchFamily="2" charset="0"/>
-                </a:endParaRPr>
-              </a:p>
-              <a:p>
-                <a:pPr marL="0" indent="0">
-                  <a:buNone/>
-                </a:pPr>
-                <a14:m>
-                  <m:oMathPara xmlns:m="http://schemas.openxmlformats.org/officeDocument/2006/math">
-                    <m:oMathParaPr>
-                      <m:jc m:val="centerGroup"/>
-                    </m:oMathParaPr>
-                    <m:oMath xmlns:m="http://schemas.openxmlformats.org/officeDocument/2006/math">
-                      <m:r>
-                        <a:rPr lang="en-US" sz="1300" b="0" i="1" smtClean="0">
-                          <a:latin typeface="Cambria Math" panose="02040503050406030204" pitchFamily="18" charset="0"/>
-                        </a:rPr>
-                        <m:t>–</m:t>
-                      </m:r>
-                      <m:r>
-                        <m:rPr>
-                          <m:nor/>
-                        </m:rPr>
-                        <a:rPr lang="en-US" sz="1300" b="0" i="0" smtClean="0">
-                          <a:latin typeface="Courier" pitchFamily="2" charset="0"/>
-                        </a:rPr>
-                        <m:t> 0.9303</m:t>
-                      </m:r>
-                      <m:r>
-                        <m:rPr>
-                          <m:nor/>
-                        </m:rPr>
-                        <a:rPr lang="en-US" sz="1300" b="0" i="0" smtClean="0">
-                          <a:latin typeface="Courier" pitchFamily="2" charset="0"/>
-                        </a:rPr>
-                        <m:t>R</m:t>
-                      </m:r>
-                      <m:r>
-                        <m:rPr>
-                          <m:nor/>
-                        </m:rPr>
-                        <a:rPr lang="en-US" sz="1300" b="0" i="0" smtClean="0">
-                          <a:latin typeface="Courier" pitchFamily="2" charset="0"/>
-                        </a:rPr>
-                        <m:t> + 0.18929</m:t>
-                      </m:r>
-                      <m:r>
-                        <m:rPr>
-                          <m:nor/>
-                        </m:rPr>
-                        <a:rPr lang="en-US" sz="1300" b="0" i="0" smtClean="0">
-                          <a:latin typeface="Courier" pitchFamily="2" charset="0"/>
-                        </a:rPr>
-                        <m:t>star</m:t>
-                      </m:r>
-                      <m:r>
-                        <m:rPr>
-                          <m:nor/>
-                        </m:rPr>
-                        <a:rPr lang="en-US" sz="1300" b="0" i="0" smtClean="0">
-                          <a:latin typeface="Courier" pitchFamily="2" charset="0"/>
-                        </a:rPr>
-                        <m:t>_</m:t>
-                      </m:r>
-                      <m:r>
-                        <m:rPr>
-                          <m:nor/>
-                        </m:rPr>
-                        <a:rPr lang="en-US" sz="1300" b="0" i="0" smtClean="0">
-                          <a:latin typeface="Courier" pitchFamily="2" charset="0"/>
-                        </a:rPr>
-                        <m:t>power</m:t>
-                      </m:r>
-                      <m:r>
-                        <m:rPr>
-                          <m:nor/>
-                        </m:rPr>
-                        <a:rPr lang="en-US" sz="1300" b="0" i="0" smtClean="0">
-                          <a:latin typeface="Courier" pitchFamily="2" charset="0"/>
-                        </a:rPr>
-                        <m:t> + 0.10356∗</m:t>
-                      </m:r>
-                      <m:r>
-                        <m:rPr>
-                          <m:nor/>
-                        </m:rPr>
-                        <a:rPr lang="en-US" sz="1300" b="0" i="0" smtClean="0">
-                          <a:latin typeface="Courier" pitchFamily="2" charset="0"/>
-                        </a:rPr>
-                        <m:t>cast</m:t>
-                      </m:r>
-                      <m:r>
-                        <m:rPr>
-                          <m:nor/>
-                        </m:rPr>
-                        <a:rPr lang="en-US" sz="1300" b="0" i="0" smtClean="0">
-                          <a:latin typeface="Courier" pitchFamily="2" charset="0"/>
-                        </a:rPr>
-                        <m:t>1_</m:t>
-                      </m:r>
-                      <m:r>
-                        <m:rPr>
-                          <m:nor/>
-                        </m:rPr>
-                        <a:rPr lang="en-US" sz="1300" b="0" i="0" smtClean="0">
-                          <a:latin typeface="Courier" pitchFamily="2" charset="0"/>
-                        </a:rPr>
-                        <m:t>starpower</m:t>
-                      </m:r>
-                      <m:r>
-                        <m:rPr>
-                          <m:nor/>
-                        </m:rPr>
-                        <a:rPr lang="en-US" sz="1300" b="0" i="0" smtClean="0">
-                          <a:latin typeface="Courier" pitchFamily="2" charset="0"/>
-                        </a:rPr>
-                        <m:t> +0∗(</m:t>
-                      </m:r>
-                      <m:r>
-                        <m:rPr>
-                          <m:nor/>
-                        </m:rPr>
-                        <a:rPr lang="en-US" sz="1300" b="0" i="0" smtClean="0">
-                          <a:latin typeface="Courier" pitchFamily="2" charset="0"/>
-                        </a:rPr>
-                        <m:t>cast</m:t>
-                      </m:r>
-                      <m:r>
-                        <m:rPr>
-                          <m:nor/>
-                        </m:rPr>
-                        <a:rPr lang="en-US" sz="1300" b="0" i="0" smtClean="0">
-                          <a:latin typeface="Courier" pitchFamily="2" charset="0"/>
-                        </a:rPr>
-                        <m:t>2_</m:t>
-                      </m:r>
-                      <m:r>
-                        <m:rPr>
-                          <m:nor/>
-                        </m:rPr>
-                        <a:rPr lang="en-US" sz="1300" b="0" i="0" smtClean="0">
-                          <a:latin typeface="Courier" pitchFamily="2" charset="0"/>
-                        </a:rPr>
-                        <m:t>starpower</m:t>
-                      </m:r>
-                      <m:r>
-                        <m:rPr>
-                          <m:nor/>
-                        </m:rPr>
-                        <a:rPr lang="en-US" sz="1300" b="0" i="0" smtClean="0">
-                          <a:latin typeface="Courier" pitchFamily="2" charset="0"/>
-                        </a:rPr>
-                        <m:t> + </m:t>
-                      </m:r>
-                      <m:r>
-                        <m:rPr>
-                          <m:nor/>
-                        </m:rPr>
-                        <a:rPr lang="en-US" sz="1300" b="0" i="0" smtClean="0">
-                          <a:latin typeface="Courier" pitchFamily="2" charset="0"/>
-                        </a:rPr>
-                        <m:t>cast</m:t>
-                      </m:r>
-                      <m:r>
-                        <m:rPr>
-                          <m:nor/>
-                        </m:rPr>
-                        <a:rPr lang="en-US" sz="1300" b="0" i="0" smtClean="0">
-                          <a:latin typeface="Courier" pitchFamily="2" charset="0"/>
-                        </a:rPr>
-                        <m:t>3_</m:t>
-                      </m:r>
-                      <m:r>
-                        <m:rPr>
-                          <m:nor/>
-                        </m:rPr>
-                        <a:rPr lang="en-US" sz="1300" b="0" i="0" smtClean="0">
-                          <a:latin typeface="Courier" pitchFamily="2" charset="0"/>
-                        </a:rPr>
-                        <m:t>starpower</m:t>
-                      </m:r>
-                      <m:r>
-                        <m:rPr>
-                          <m:nor/>
-                        </m:rPr>
-                        <a:rPr lang="en-US" sz="1300" b="0" i="0" smtClean="0">
-                          <a:latin typeface="Courier" pitchFamily="2" charset="0"/>
-                        </a:rPr>
-                        <m:t>) + 0.14988</m:t>
-                      </m:r>
-                      <m:r>
-                        <m:rPr>
-                          <m:nor/>
-                        </m:rPr>
-                        <a:rPr lang="en-US" sz="1300" b="0" i="0" smtClean="0">
-                          <a:latin typeface="Courier" pitchFamily="2" charset="0"/>
-                        </a:rPr>
-                        <m:t>budget</m:t>
-                      </m:r>
-                      <m:r>
-                        <m:rPr>
-                          <m:nor/>
-                        </m:rPr>
-                        <a:rPr lang="en-US" sz="1300" b="0" i="0" smtClean="0">
-                          <a:latin typeface="Courier" pitchFamily="2" charset="0"/>
-                        </a:rPr>
-                        <m:t> </m:t>
-                      </m:r>
-                    </m:oMath>
-                  </m:oMathPara>
-                </a14:m>
-                <a:endParaRPr lang="en-US" sz="1300" b="0" i="0" dirty="0">
-                  <a:latin typeface="Courier" pitchFamily="2" charset="0"/>
-                </a:endParaRPr>
-              </a:p>
-              <a:p>
-                <a:pPr marL="0" indent="0">
-                  <a:buNone/>
-                </a:pPr>
-                <a14:m>
-                  <m:oMathPara xmlns:m="http://schemas.openxmlformats.org/officeDocument/2006/math">
-                    <m:oMathParaPr>
-                      <m:jc m:val="centerGroup"/>
-                    </m:oMathParaPr>
-                    <m:oMath xmlns:m="http://schemas.openxmlformats.org/officeDocument/2006/math">
-                      <m:r>
-                        <m:rPr>
-                          <m:nor/>
-                        </m:rPr>
-                        <a:rPr lang="en-US" sz="1300" b="0" i="0" smtClean="0">
-                          <a:latin typeface="Courier" pitchFamily="2" charset="0"/>
-                        </a:rPr>
-                        <m:t>+ 1.5468</m:t>
-                      </m:r>
-                    </m:oMath>
-                  </m:oMathPara>
-                </a14:m>
-                <a:endParaRPr lang="en-US" sz="1300" dirty="0">
-                  <a:latin typeface="Courier" pitchFamily="2" charset="0"/>
-                </a:endParaRPr>
-              </a:p>
-            </p:txBody>
-          </p:sp>
-        </mc:Choice>
-        <mc:Fallback xmlns="">
-          <p:sp>
-            <p:nvSpPr>
-              <p:cNvPr id="3" name="Content Placeholder 2">
-                <a:extLst>
-                  <a:ext uri="{FF2B5EF4-FFF2-40B4-BE49-F238E27FC236}">
-                    <a16:creationId xmlns:a16="http://schemas.microsoft.com/office/drawing/2014/main" id="{5694EFCD-EC71-C84D-A1D5-98B3236420DF}"/>
-                  </a:ext>
-                </a:extLst>
-              </p:cNvPr>
-              <p:cNvSpPr>
-                <a:spLocks noGrp="1" noRot="1" noChangeAspect="1" noMove="1" noResize="1" noEditPoints="1" noAdjustHandles="1" noChangeArrowheads="1" noChangeShapeType="1" noTextEdit="1"/>
-              </p:cNvSpPr>
-              <p:nvPr>
-                <p:ph idx="1"/>
-              </p:nvPr>
-            </p:nvSpPr>
-            <p:spPr>
-              <a:xfrm>
-                <a:off x="528204" y="921760"/>
-                <a:ext cx="11135591" cy="5790767"/>
-              </a:xfrm>
-              <a:blipFill>
-                <a:blip r:embed="rId2"/>
-                <a:stretch>
-                  <a:fillRect/>
-                </a:stretch>
-              </a:blipFill>
-            </p:spPr>
-            <p:txBody>
-              <a:bodyPr/>
-              <a:lstStyle/>
-              <a:p>
-                <a:r>
-                  <a:rPr lang="en-US">
-                    <a:noFill/>
-                  </a:rPr>
-                  <a:t> </a:t>
-                </a:r>
-              </a:p>
-            </p:txBody>
-          </p:sp>
-        </mc:Fallback>
-      </mc:AlternateContent>
       <p:sp>
         <p:nvSpPr>
           <p:cNvPr id="4" name="Slide Number Placeholder 3">
@@ -5751,6 +3921,65 @@
           </a:p>
         </p:txBody>
       </p:sp>
+      <p:pic>
+        <p:nvPicPr>
+          <p:cNvPr id="9" name="Content Placeholder 8" descr="Text&#10;&#10;Description automatically generated">
+            <a:extLst>
+              <a:ext uri="{FF2B5EF4-FFF2-40B4-BE49-F238E27FC236}">
+                <a16:creationId xmlns:a16="http://schemas.microsoft.com/office/drawing/2014/main" id="{15EB9FC9-C3B2-1B48-BA30-5AA2E532A936}"/>
+              </a:ext>
+            </a:extLst>
+          </p:cNvPr>
+          <p:cNvPicPr>
+            <a:picLocks noGrp="1" noChangeAspect="1"/>
+          </p:cNvPicPr>
+          <p:nvPr>
+            <p:ph idx="1"/>
+          </p:nvPr>
+        </p:nvPicPr>
+        <p:blipFill>
+          <a:blip r:embed="rId2"/>
+          <a:stretch>
+            <a:fillRect/>
+          </a:stretch>
+        </p:blipFill>
+        <p:spPr>
+          <a:xfrm>
+            <a:off x="4810636" y="788982"/>
+            <a:ext cx="2947015" cy="4905099"/>
+          </a:xfrm>
+        </p:spPr>
+      </p:pic>
+      <p:pic>
+        <p:nvPicPr>
+          <p:cNvPr id="11" name="Picture 10" descr="Graphical user interface, text, application, Teams&#10;&#10;Description automatically generated">
+            <a:extLst>
+              <a:ext uri="{FF2B5EF4-FFF2-40B4-BE49-F238E27FC236}">
+                <a16:creationId xmlns:a16="http://schemas.microsoft.com/office/drawing/2014/main" id="{5C06FC6A-BAD4-1745-BD92-DD85740C6339}"/>
+              </a:ext>
+            </a:extLst>
+          </p:cNvPr>
+          <p:cNvPicPr>
+            <a:picLocks noChangeAspect="1"/>
+          </p:cNvPicPr>
+          <p:nvPr/>
+        </p:nvPicPr>
+        <p:blipFill>
+          <a:blip r:embed="rId3"/>
+          <a:stretch>
+            <a:fillRect/>
+          </a:stretch>
+        </p:blipFill>
+        <p:spPr>
+          <a:xfrm>
+            <a:off x="4810635" y="5766088"/>
+            <a:ext cx="2971659" cy="590261"/>
+          </a:xfrm>
+          <a:prstGeom prst="rect">
+            <a:avLst/>
+          </a:prstGeom>
+        </p:spPr>
+      </p:pic>
     </p:spTree>
     <p:extLst>
       <p:ext uri="{BB962C8B-B14F-4D97-AF65-F5344CB8AC3E}">
@@ -5875,7 +4104,13 @@
                         <a:rPr lang="en-US" sz="5400" b="0" i="1" smtClean="0">
                           <a:latin typeface="Cambria Math" panose="02040503050406030204" pitchFamily="18" charset="0"/>
                         </a:rPr>
-                        <m:t>=0.363</m:t>
+                        <m:t>=0.3</m:t>
+                      </m:r>
+                      <m:r>
+                        <a:rPr lang="en-US" sz="5400" b="0" i="1" smtClean="0">
+                          <a:latin typeface="Cambria Math" panose="02040503050406030204" pitchFamily="18" charset="0"/>
+                        </a:rPr>
+                        <m:t>839</m:t>
                       </m:r>
                     </m:oMath>
                   </m:oMathPara>
@@ -6028,35 +4263,6 @@
           </a:p>
         </p:txBody>
       </p:sp>
-      <p:pic>
-        <p:nvPicPr>
-          <p:cNvPr id="5" name="Content Placeholder 4" descr="Chart, scatter chart&#10;&#10;Description automatically generated">
-            <a:extLst>
-              <a:ext uri="{FF2B5EF4-FFF2-40B4-BE49-F238E27FC236}">
-                <a16:creationId xmlns:a16="http://schemas.microsoft.com/office/drawing/2014/main" id="{93C6EB0B-5DDA-6D43-8C48-81E2F2D26D22}"/>
-              </a:ext>
-            </a:extLst>
-          </p:cNvPr>
-          <p:cNvPicPr>
-            <a:picLocks noGrp="1" noChangeAspect="1"/>
-          </p:cNvPicPr>
-          <p:nvPr>
-            <p:ph idx="1"/>
-          </p:nvPr>
-        </p:nvPicPr>
-        <p:blipFill>
-          <a:blip r:embed="rId2"/>
-          <a:stretch>
-            <a:fillRect/>
-          </a:stretch>
-        </p:blipFill>
-        <p:spPr>
-          <a:xfrm>
-            <a:off x="2324624" y="-499965"/>
-            <a:ext cx="8042562" cy="8042562"/>
-          </a:xfrm>
-        </p:spPr>
-      </p:pic>
       <p:sp>
         <p:nvSpPr>
           <p:cNvPr id="6" name="TextBox 5">
@@ -6087,7 +4293,7 @@
           <a:p>
             <a:r>
               <a:rPr lang="en-US" dirty="0"/>
-              <a:t>Mean of the Error = -0.02</a:t>
+              <a:t>Mean of the Error = -0.05</a:t>
             </a:r>
           </a:p>
         </p:txBody>
@@ -6121,6 +4327,36 @@
           </a:p>
         </p:txBody>
       </p:sp>
+      <p:pic>
+        <p:nvPicPr>
+          <p:cNvPr id="11" name="Picture 10" descr="Chart, scatter chart&#10;&#10;Description automatically generated">
+            <a:extLst>
+              <a:ext uri="{FF2B5EF4-FFF2-40B4-BE49-F238E27FC236}">
+                <a16:creationId xmlns:a16="http://schemas.microsoft.com/office/drawing/2014/main" id="{CAE618EB-A49F-E748-8980-C1CE29933BD2}"/>
+              </a:ext>
+            </a:extLst>
+          </p:cNvPr>
+          <p:cNvPicPr>
+            <a:picLocks noChangeAspect="1"/>
+          </p:cNvPicPr>
+          <p:nvPr/>
+        </p:nvPicPr>
+        <p:blipFill>
+          <a:blip r:embed="rId2"/>
+          <a:stretch>
+            <a:fillRect/>
+          </a:stretch>
+        </p:blipFill>
+        <p:spPr>
+          <a:xfrm>
+            <a:off x="2667000" y="-209262"/>
+            <a:ext cx="7774858" cy="7774858"/>
+          </a:xfrm>
+          <a:prstGeom prst="rect">
+            <a:avLst/>
+          </a:prstGeom>
+        </p:spPr>
+      </p:pic>
     </p:spTree>
     <p:extLst>
       <p:ext uri="{BB962C8B-B14F-4D97-AF65-F5344CB8AC3E}">
@@ -6189,12 +4425,41 @@
           </a:p>
         </p:txBody>
       </p:sp>
+      <p:sp>
+        <p:nvSpPr>
+          <p:cNvPr id="6" name="Slide Number Placeholder 5">
+            <a:extLst>
+              <a:ext uri="{FF2B5EF4-FFF2-40B4-BE49-F238E27FC236}">
+                <a16:creationId xmlns:a16="http://schemas.microsoft.com/office/drawing/2014/main" id="{EEE7BABA-5E94-8045-9D8D-93F75A95FCDD}"/>
+              </a:ext>
+            </a:extLst>
+          </p:cNvPr>
+          <p:cNvSpPr>
+            <a:spLocks noGrp="1"/>
+          </p:cNvSpPr>
+          <p:nvPr>
+            <p:ph type="sldNum" sz="quarter" idx="12"/>
+          </p:nvPr>
+        </p:nvSpPr>
+        <p:spPr/>
+        <p:txBody>
+          <a:bodyPr/>
+          <a:lstStyle/>
+          <a:p>
+            <a:fld id="{8FD628FE-D6DE-D844-B3CE-80CC651E15E2}" type="slidenum">
+              <a:rPr lang="en-US" smtClean="0"/>
+              <a:t>13</a:t>
+            </a:fld>
+            <a:endParaRPr lang="en-US" dirty="0"/>
+          </a:p>
+        </p:txBody>
+      </p:sp>
       <p:pic>
         <p:nvPicPr>
-          <p:cNvPr id="5" name="Content Placeholder 4" descr="Logo&#10;&#10;Description automatically generated">
-            <a:extLst>
-              <a:ext uri="{FF2B5EF4-FFF2-40B4-BE49-F238E27FC236}">
-                <a16:creationId xmlns:a16="http://schemas.microsoft.com/office/drawing/2014/main" id="{C3C133CA-4C8F-0A40-A3D2-23491AC33529}"/>
+          <p:cNvPr id="8" name="Content Placeholder 7" descr="A picture containing logo&#10;&#10;Description automatically generated">
+            <a:extLst>
+              <a:ext uri="{FF2B5EF4-FFF2-40B4-BE49-F238E27FC236}">
+                <a16:creationId xmlns:a16="http://schemas.microsoft.com/office/drawing/2014/main" id="{6853528D-5C9D-A241-9D53-55F50D304A98}"/>
               </a:ext>
             </a:extLst>
           </p:cNvPr>
@@ -6213,40 +4478,11 @@
         </p:blipFill>
         <p:spPr>
           <a:xfrm>
-            <a:off x="2568581" y="-70341"/>
-            <a:ext cx="7413619" cy="7413619"/>
+            <a:off x="2236697" y="-510293"/>
+            <a:ext cx="8013432" cy="8013432"/>
           </a:xfrm>
         </p:spPr>
       </p:pic>
-      <p:sp>
-        <p:nvSpPr>
-          <p:cNvPr id="6" name="Slide Number Placeholder 5">
-            <a:extLst>
-              <a:ext uri="{FF2B5EF4-FFF2-40B4-BE49-F238E27FC236}">
-                <a16:creationId xmlns:a16="http://schemas.microsoft.com/office/drawing/2014/main" id="{EEE7BABA-5E94-8045-9D8D-93F75A95FCDD}"/>
-              </a:ext>
-            </a:extLst>
-          </p:cNvPr>
-          <p:cNvSpPr>
-            <a:spLocks noGrp="1"/>
-          </p:cNvSpPr>
-          <p:nvPr>
-            <p:ph type="sldNum" sz="quarter" idx="12"/>
-          </p:nvPr>
-        </p:nvSpPr>
-        <p:spPr/>
-        <p:txBody>
-          <a:bodyPr/>
-          <a:lstStyle/>
-          <a:p>
-            <a:fld id="{8FD628FE-D6DE-D844-B3CE-80CC651E15E2}" type="slidenum">
-              <a:rPr lang="en-US" smtClean="0"/>
-              <a:t>13</a:t>
-            </a:fld>
-            <a:endParaRPr lang="en-US" dirty="0"/>
-          </a:p>
-        </p:txBody>
-      </p:sp>
     </p:spTree>
     <p:extLst>
       <p:ext uri="{BB962C8B-B14F-4D97-AF65-F5344CB8AC3E}">
@@ -6315,12 +4551,41 @@
           </a:p>
         </p:txBody>
       </p:sp>
+      <p:sp>
+        <p:nvSpPr>
+          <p:cNvPr id="12" name="Slide Number Placeholder 11">
+            <a:extLst>
+              <a:ext uri="{FF2B5EF4-FFF2-40B4-BE49-F238E27FC236}">
+                <a16:creationId xmlns:a16="http://schemas.microsoft.com/office/drawing/2014/main" id="{6ADCBEB7-6FA2-7842-A0AE-709B52E320D4}"/>
+              </a:ext>
+            </a:extLst>
+          </p:cNvPr>
+          <p:cNvSpPr>
+            <a:spLocks noGrp="1"/>
+          </p:cNvSpPr>
+          <p:nvPr>
+            <p:ph type="sldNum" sz="quarter" idx="12"/>
+          </p:nvPr>
+        </p:nvSpPr>
+        <p:spPr/>
+        <p:txBody>
+          <a:bodyPr/>
+          <a:lstStyle/>
+          <a:p>
+            <a:fld id="{8FD628FE-D6DE-D844-B3CE-80CC651E15E2}" type="slidenum">
+              <a:rPr lang="en-US" smtClean="0"/>
+              <a:t>14</a:t>
+            </a:fld>
+            <a:endParaRPr lang="en-US" dirty="0"/>
+          </a:p>
+        </p:txBody>
+      </p:sp>
       <p:pic>
         <p:nvPicPr>
-          <p:cNvPr id="11" name="Content Placeholder 10" descr="Chart, line chart&#10;&#10;Description automatically generated">
-            <a:extLst>
-              <a:ext uri="{FF2B5EF4-FFF2-40B4-BE49-F238E27FC236}">
-                <a16:creationId xmlns:a16="http://schemas.microsoft.com/office/drawing/2014/main" id="{4FB758B1-55CE-2849-B268-09EB50339E67}"/>
+          <p:cNvPr id="6" name="Content Placeholder 5" descr="Chart&#10;&#10;Description automatically generated">
+            <a:extLst>
+              <a:ext uri="{FF2B5EF4-FFF2-40B4-BE49-F238E27FC236}">
+                <a16:creationId xmlns:a16="http://schemas.microsoft.com/office/drawing/2014/main" id="{3EB9B431-1ED7-7C4D-BE29-6D54F6BCC4A7}"/>
               </a:ext>
             </a:extLst>
           </p:cNvPr>
@@ -6339,40 +4604,11 @@
         </p:blipFill>
         <p:spPr>
           <a:xfrm>
-            <a:off x="2105609" y="-357249"/>
-            <a:ext cx="7980781" cy="7980781"/>
+            <a:off x="2188003" y="-325509"/>
+            <a:ext cx="7815993" cy="7815993"/>
           </a:xfrm>
         </p:spPr>
       </p:pic>
-      <p:sp>
-        <p:nvSpPr>
-          <p:cNvPr id="12" name="Slide Number Placeholder 11">
-            <a:extLst>
-              <a:ext uri="{FF2B5EF4-FFF2-40B4-BE49-F238E27FC236}">
-                <a16:creationId xmlns:a16="http://schemas.microsoft.com/office/drawing/2014/main" id="{6ADCBEB7-6FA2-7842-A0AE-709B52E320D4}"/>
-              </a:ext>
-            </a:extLst>
-          </p:cNvPr>
-          <p:cNvSpPr>
-            <a:spLocks noGrp="1"/>
-          </p:cNvSpPr>
-          <p:nvPr>
-            <p:ph type="sldNum" sz="quarter" idx="12"/>
-          </p:nvPr>
-        </p:nvSpPr>
-        <p:spPr/>
-        <p:txBody>
-          <a:bodyPr/>
-          <a:lstStyle/>
-          <a:p>
-            <a:fld id="{8FD628FE-D6DE-D844-B3CE-80CC651E15E2}" type="slidenum">
-              <a:rPr lang="en-US" smtClean="0"/>
-              <a:t>14</a:t>
-            </a:fld>
-            <a:endParaRPr lang="en-US" dirty="0"/>
-          </a:p>
-        </p:txBody>
-      </p:sp>
     </p:spTree>
     <p:extLst>
       <p:ext uri="{BB962C8B-B14F-4D97-AF65-F5344CB8AC3E}">
@@ -7881,21 +6117,48 @@
           </a:p>
         </p:txBody>
       </p:sp>
+      <p:sp>
+        <p:nvSpPr>
+          <p:cNvPr id="6" name="Slide Number Placeholder 5">
+            <a:extLst>
+              <a:ext uri="{FF2B5EF4-FFF2-40B4-BE49-F238E27FC236}">
+                <a16:creationId xmlns:a16="http://schemas.microsoft.com/office/drawing/2014/main" id="{2DE82AD2-FC4C-4640-BD9D-94054D57A4E9}"/>
+              </a:ext>
+            </a:extLst>
+          </p:cNvPr>
+          <p:cNvSpPr>
+            <a:spLocks noGrp="1"/>
+          </p:cNvSpPr>
+          <p:nvPr>
+            <p:ph type="sldNum" sz="quarter" idx="12"/>
+          </p:nvPr>
+        </p:nvSpPr>
+        <p:spPr/>
+        <p:txBody>
+          <a:bodyPr/>
+          <a:lstStyle/>
+          <a:p>
+            <a:fld id="{8FD628FE-D6DE-D844-B3CE-80CC651E15E2}" type="slidenum">
+              <a:rPr lang="en-US" smtClean="0"/>
+              <a:t>8</a:t>
+            </a:fld>
+            <a:endParaRPr lang="en-US" dirty="0"/>
+          </a:p>
+        </p:txBody>
+      </p:sp>
       <p:pic>
         <p:nvPicPr>
-          <p:cNvPr id="5" name="Content Placeholder 4" descr="Chart&#10;&#10;Description automatically generated">
-            <a:extLst>
-              <a:ext uri="{FF2B5EF4-FFF2-40B4-BE49-F238E27FC236}">
-                <a16:creationId xmlns:a16="http://schemas.microsoft.com/office/drawing/2014/main" id="{62D17064-FD09-A14A-8500-F48942A81DAF}"/>
+          <p:cNvPr id="12" name="Picture 11" descr="Chart&#10;&#10;Description automatically generated">
+            <a:extLst>
+              <a:ext uri="{FF2B5EF4-FFF2-40B4-BE49-F238E27FC236}">
+                <a16:creationId xmlns:a16="http://schemas.microsoft.com/office/drawing/2014/main" id="{A5C6A7F8-2318-A543-81A1-D04C29A86FA7}"/>
               </a:ext>
             </a:extLst>
           </p:cNvPr>
           <p:cNvPicPr>
-            <a:picLocks noGrp="1" noChangeAspect="1"/>
+            <a:picLocks noChangeAspect="1"/>
           </p:cNvPicPr>
-          <p:nvPr>
-            <p:ph idx="1"/>
-          </p:nvPr>
+          <p:nvPr/>
         </p:nvPicPr>
         <p:blipFill>
           <a:blip r:embed="rId2"/>
@@ -7905,40 +6168,14 @@
         </p:blipFill>
         <p:spPr>
           <a:xfrm>
-            <a:off x="2268649" y="-257919"/>
-            <a:ext cx="7821127" cy="7821127"/>
+            <a:off x="2667000" y="0"/>
+            <a:ext cx="7538884" cy="7538884"/>
           </a:xfrm>
+          <a:prstGeom prst="rect">
+            <a:avLst/>
+          </a:prstGeom>
         </p:spPr>
       </p:pic>
-      <p:sp>
-        <p:nvSpPr>
-          <p:cNvPr id="6" name="Slide Number Placeholder 5">
-            <a:extLst>
-              <a:ext uri="{FF2B5EF4-FFF2-40B4-BE49-F238E27FC236}">
-                <a16:creationId xmlns:a16="http://schemas.microsoft.com/office/drawing/2014/main" id="{2DE82AD2-FC4C-4640-BD9D-94054D57A4E9}"/>
-              </a:ext>
-            </a:extLst>
-          </p:cNvPr>
-          <p:cNvSpPr>
-            <a:spLocks noGrp="1"/>
-          </p:cNvSpPr>
-          <p:nvPr>
-            <p:ph type="sldNum" sz="quarter" idx="12"/>
-          </p:nvPr>
-        </p:nvSpPr>
-        <p:spPr/>
-        <p:txBody>
-          <a:bodyPr/>
-          <a:lstStyle/>
-          <a:p>
-            <a:fld id="{8FD628FE-D6DE-D844-B3CE-80CC651E15E2}" type="slidenum">
-              <a:rPr lang="en-US" smtClean="0"/>
-              <a:t>8</a:t>
-            </a:fld>
-            <a:endParaRPr lang="en-US" dirty="0"/>
-          </a:p>
-        </p:txBody>
-      </p:sp>
     </p:spTree>
     <p:extLst>
       <p:ext uri="{BB962C8B-B14F-4D97-AF65-F5344CB8AC3E}">
@@ -7969,21 +6206,94 @@
           <a:chExt cx="0" cy="0"/>
         </a:xfrm>
       </p:grpSpPr>
+      <p:sp>
+        <p:nvSpPr>
+          <p:cNvPr id="6" name="Title 1">
+            <a:extLst>
+              <a:ext uri="{FF2B5EF4-FFF2-40B4-BE49-F238E27FC236}">
+                <a16:creationId xmlns:a16="http://schemas.microsoft.com/office/drawing/2014/main" id="{5443FA03-34AA-5A47-AE66-9CEEEDE783BB}"/>
+              </a:ext>
+            </a:extLst>
+          </p:cNvPr>
+          <p:cNvSpPr>
+            <a:spLocks noGrp="1"/>
+          </p:cNvSpPr>
+          <p:nvPr>
+            <p:ph type="title"/>
+          </p:nvPr>
+        </p:nvSpPr>
+        <p:spPr>
+          <a:xfrm>
+            <a:off x="838200" y="365126"/>
+            <a:ext cx="10515600" cy="475134"/>
+          </a:xfrm>
+        </p:spPr>
+        <p:txBody>
+          <a:bodyPr>
+            <a:normAutofit fontScale="90000"/>
+          </a:bodyPr>
+          <a:lstStyle/>
+          <a:p>
+            <a:pPr algn="ctr"/>
+            <a:r>
+              <a:rPr lang="en-US" sz="2400" dirty="0">
+                <a:latin typeface="CCMeanwhile" pitchFamily="2" charset="77"/>
+              </a:rPr>
+              <a:t>Top 5 Positive and Negative Correlation Features</a:t>
+            </a:r>
+            <a:br>
+              <a:rPr lang="en-US" sz="2400" dirty="0">
+                <a:latin typeface="CCMeanwhile" pitchFamily="2" charset="77"/>
+              </a:rPr>
+            </a:br>
+            <a:endParaRPr lang="en-US" sz="2400" dirty="0">
+              <a:latin typeface="CCMeanwhile" pitchFamily="2" charset="77"/>
+            </a:endParaRPr>
+          </a:p>
+        </p:txBody>
+      </p:sp>
+      <p:sp>
+        <p:nvSpPr>
+          <p:cNvPr id="7" name="Slide Number Placeholder 6">
+            <a:extLst>
+              <a:ext uri="{FF2B5EF4-FFF2-40B4-BE49-F238E27FC236}">
+                <a16:creationId xmlns:a16="http://schemas.microsoft.com/office/drawing/2014/main" id="{93BE8759-92F8-0F4F-BB60-6C6FE2368D9A}"/>
+              </a:ext>
+            </a:extLst>
+          </p:cNvPr>
+          <p:cNvSpPr>
+            <a:spLocks noGrp="1"/>
+          </p:cNvSpPr>
+          <p:nvPr>
+            <p:ph type="sldNum" sz="quarter" idx="12"/>
+          </p:nvPr>
+        </p:nvSpPr>
+        <p:spPr/>
+        <p:txBody>
+          <a:bodyPr/>
+          <a:lstStyle/>
+          <a:p>
+            <a:fld id="{8FD628FE-D6DE-D844-B3CE-80CC651E15E2}" type="slidenum">
+              <a:rPr lang="en-US" smtClean="0"/>
+              <a:t>9</a:t>
+            </a:fld>
+            <a:endParaRPr lang="en-US" dirty="0"/>
+          </a:p>
+        </p:txBody>
+      </p:sp>
       <p:pic>
         <p:nvPicPr>
-          <p:cNvPr id="5" name="Content Placeholder 4" descr="Chart, funnel chart&#10;&#10;Description automatically generated">
-            <a:extLst>
-              <a:ext uri="{FF2B5EF4-FFF2-40B4-BE49-F238E27FC236}">
-                <a16:creationId xmlns:a16="http://schemas.microsoft.com/office/drawing/2014/main" id="{40D18D95-D201-BD45-ADB1-F27781A1D96B}"/>
+          <p:cNvPr id="8" name="Picture 7" descr="Chart, funnel chart&#10;&#10;Description automatically generated">
+            <a:extLst>
+              <a:ext uri="{FF2B5EF4-FFF2-40B4-BE49-F238E27FC236}">
+                <a16:creationId xmlns:a16="http://schemas.microsoft.com/office/drawing/2014/main" id="{AF325A12-36CD-8948-904B-9B97233D9106}"/>
               </a:ext>
             </a:extLst>
           </p:cNvPr>
           <p:cNvPicPr>
-            <a:picLocks noGrp="1" noChangeAspect="1"/>
+            <a:picLocks noChangeAspect="1"/>
           </p:cNvPicPr>
-          <p:nvPr>
-            <p:ph idx="1"/>
-          </p:nvPr>
+          <p:nvPr/>
         </p:nvPicPr>
         <p:blipFill>
           <a:blip r:embed="rId2"/>
@@ -7993,86 +6303,14 @@
         </p:blipFill>
         <p:spPr>
           <a:xfrm>
-            <a:off x="2622871" y="-139101"/>
-            <a:ext cx="7682664" cy="7682664"/>
+            <a:off x="2175587" y="-130629"/>
+            <a:ext cx="7553131" cy="7553131"/>
           </a:xfrm>
+          <a:prstGeom prst="rect">
+            <a:avLst/>
+          </a:prstGeom>
         </p:spPr>
       </p:pic>
-      <p:sp>
-        <p:nvSpPr>
-          <p:cNvPr id="6" name="Title 1">
-            <a:extLst>
-              <a:ext uri="{FF2B5EF4-FFF2-40B4-BE49-F238E27FC236}">
-                <a16:creationId xmlns:a16="http://schemas.microsoft.com/office/drawing/2014/main" id="{5443FA03-34AA-5A47-AE66-9CEEEDE783BB}"/>
-              </a:ext>
-            </a:extLst>
-          </p:cNvPr>
-          <p:cNvSpPr>
-            <a:spLocks noGrp="1"/>
-          </p:cNvSpPr>
-          <p:nvPr>
-            <p:ph type="title"/>
-          </p:nvPr>
-        </p:nvSpPr>
-        <p:spPr>
-          <a:xfrm>
-            <a:off x="838200" y="365126"/>
-            <a:ext cx="10515600" cy="475134"/>
-          </a:xfrm>
-        </p:spPr>
-        <p:txBody>
-          <a:bodyPr>
-            <a:normAutofit fontScale="90000"/>
-          </a:bodyPr>
-          <a:lstStyle/>
-          <a:p>
-            <a:pPr algn="ctr"/>
-            <a:r>
-              <a:rPr lang="en-US" sz="2400" dirty="0">
-                <a:latin typeface="CCMeanwhile" pitchFamily="2" charset="77"/>
-              </a:rPr>
-              <a:t>Top 5 Positive and Negative Correlation Features</a:t>
-            </a:r>
-            <a:br>
-              <a:rPr lang="en-US" sz="2400" dirty="0">
-                <a:latin typeface="CCMeanwhile" pitchFamily="2" charset="77"/>
-              </a:rPr>
-            </a:br>
-            <a:endParaRPr lang="en-US" sz="2400" dirty="0">
-              <a:latin typeface="CCMeanwhile" pitchFamily="2" charset="77"/>
-            </a:endParaRPr>
-          </a:p>
-        </p:txBody>
-      </p:sp>
-      <p:sp>
-        <p:nvSpPr>
-          <p:cNvPr id="7" name="Slide Number Placeholder 6">
-            <a:extLst>
-              <a:ext uri="{FF2B5EF4-FFF2-40B4-BE49-F238E27FC236}">
-                <a16:creationId xmlns:a16="http://schemas.microsoft.com/office/drawing/2014/main" id="{93BE8759-92F8-0F4F-BB60-6C6FE2368D9A}"/>
-              </a:ext>
-            </a:extLst>
-          </p:cNvPr>
-          <p:cNvSpPr>
-            <a:spLocks noGrp="1"/>
-          </p:cNvSpPr>
-          <p:nvPr>
-            <p:ph type="sldNum" sz="quarter" idx="12"/>
-          </p:nvPr>
-        </p:nvSpPr>
-        <p:spPr/>
-        <p:txBody>
-          <a:bodyPr/>
-          <a:lstStyle/>
-          <a:p>
-            <a:fld id="{8FD628FE-D6DE-D844-B3CE-80CC651E15E2}" type="slidenum">
-              <a:rPr lang="en-US" smtClean="0"/>
-              <a:t>9</a:t>
-            </a:fld>
-            <a:endParaRPr lang="en-US" dirty="0"/>
-          </a:p>
-        </p:txBody>
-      </p:sp>
     </p:spTree>
     <p:extLst>
       <p:ext uri="{BB962C8B-B14F-4D97-AF65-F5344CB8AC3E}">

</xml_diff>